<commit_message>
additional corrections for 1.0.0
</commit_message>
<xml_diff>
--- a/slides/flink_stream_basics.pptx
+++ b/slides/flink_stream_basics.pptx
@@ -248,7 +248,7 @@
           <a:p>
             <a:fld id="{F01141F9-3E73-7448-86C2-E96D93FE379F}" type="datetimeFigureOut">
               <a:rPr lang="en-US" smtClean="0"/>
-              <a:t>29/03/16</a:t>
+              <a:t>31/03/16</a:t>
             </a:fld>
             <a:endParaRPr lang="en-US"/>
           </a:p>
@@ -4075,48 +4075,6 @@
           </a:p>
         </p:txBody>
       </p:sp>
-      <p:sp>
-        <p:nvSpPr>
-          <p:cNvPr id="4" name="TextBox 3"/>
-          <p:cNvSpPr txBox="1"/>
-          <p:nvPr/>
-        </p:nvSpPr>
-        <p:spPr>
-          <a:xfrm>
-            <a:off x="3632248" y="6226328"/>
-            <a:ext cx="2228907" cy="369332"/>
-          </a:xfrm>
-          <a:prstGeom prst="rect">
-            <a:avLst/>
-          </a:prstGeom>
-          <a:noFill/>
-        </p:spPr>
-        <p:txBody>
-          <a:bodyPr wrap="none" rtlCol="0">
-            <a:spAutoFit/>
-          </a:bodyPr>
-          <a:lstStyle/>
-          <a:p>
-            <a:r>
-              <a:rPr lang="en-US" dirty="0" smtClean="0">
-                <a:solidFill>
-                  <a:schemeClr val="bg1"/>
-                </a:solidFill>
-                <a:latin typeface="Avenir Book"/>
-                <a:cs typeface="Avenir Book"/>
-              </a:rPr>
-              <a:t>December 10, 2015</a:t>
-            </a:r>
-            <a:endParaRPr lang="en-US" dirty="0">
-              <a:solidFill>
-                <a:schemeClr val="bg1"/>
-              </a:solidFill>
-              <a:latin typeface="Avenir Book"/>
-              <a:cs typeface="Avenir Book"/>
-            </a:endParaRPr>
-          </a:p>
-        </p:txBody>
-      </p:sp>
     </p:spTree>
     <p:extLst>
       <p:ext uri="{BB962C8B-B14F-4D97-AF65-F5344CB8AC3E}">
@@ -11768,13 +11726,8 @@
           <a:p>
             <a:r>
               <a:rPr lang="en-US" dirty="0" smtClean="0"/>
-              <a:t>All examples here in Java for Flink </a:t>
-            </a:r>
-            <a:r>
-              <a:rPr lang="en-US" dirty="0" smtClean="0"/>
-              <a:t>1.0</a:t>
-            </a:r>
-            <a:endParaRPr lang="en-US" dirty="0" smtClean="0"/>
+              <a:t>All examples here in Java for Flink 1.0</a:t>
+            </a:r>
           </a:p>
           <a:p>
             <a:endParaRPr lang="en-US" sz="1400" dirty="0" smtClean="0"/>
@@ -19742,7 +19695,7 @@
                 </a:solidFill>
                 <a:latin typeface="Menlo"/>
               </a:rPr>
-              <a:t>OperatorState</a:t>
+              <a:t>ValueState</a:t>
             </a:r>
             <a:r>
               <a:rPr lang="en-US" sz="1300" dirty="0" smtClean="0">
@@ -19935,13 +19888,13 @@
               <a:t>      			.</a:t>
             </a:r>
             <a:r>
-              <a:rPr lang="en-US" sz="1300" dirty="0" err="1">
+              <a:rPr lang="en-US" sz="1300" dirty="0" err="1" smtClean="0">
                 <a:solidFill>
                   <a:srgbClr val="FF0000"/>
                 </a:solidFill>
                 <a:latin typeface="Menlo"/>
               </a:rPr>
-              <a:t>getKeyValueState</a:t>
+              <a:t>getState</a:t>
             </a:r>
             <a:r>
               <a:rPr lang="en-US" sz="1300" dirty="0">

</xml_diff>

<commit_message>
Updated slides for Flink 1.3
</commit_message>
<xml_diff>
--- a/slides/flink_stream_basics.pptx
+++ b/slides/flink_stream_basics.pptx
@@ -5,7 +5,7 @@
     <p:sldMasterId id="2147483661" r:id="rId1"/>
   </p:sldMasterIdLst>
   <p:notesMasterIdLst>
-    <p:notesMasterId r:id="rId47"/>
+    <p:notesMasterId r:id="rId46"/>
   </p:notesMasterIdLst>
   <p:sldIdLst>
     <p:sldId id="256" r:id="rId2"/>
@@ -52,7 +52,6 @@
     <p:sldId id="297" r:id="rId43"/>
     <p:sldId id="298" r:id="rId44"/>
     <p:sldId id="299" r:id="rId45"/>
-    <p:sldId id="300" r:id="rId46"/>
   </p:sldIdLst>
   <p:sldSz cx="9144000" cy="6858000" type="screen4x3"/>
   <p:notesSz cx="6858000" cy="9144000"/>
@@ -2287,8 +2286,8 @@
         </p:nvSpPr>
         <p:spPr>
           <a:xfrm>
-            <a:off x="1003785" y="685631"/>
-            <a:ext cx="4850429" cy="3429513"/>
+            <a:off x="1143000" y="685800"/>
+            <a:ext cx="4572000" cy="3429000"/>
           </a:xfrm>
           <a:custGeom>
             <a:avLst/>
@@ -4869,111 +4868,6 @@
       <p:sp>
         <p:nvSpPr>
           <p:cNvPr id="419" name="Shape 419"/>
-          <p:cNvSpPr>
-            <a:spLocks noGrp="1" noRot="1" noChangeAspect="1"/>
-          </p:cNvSpPr>
-          <p:nvPr>
-            <p:ph type="sldImg" idx="2"/>
-          </p:nvPr>
-        </p:nvSpPr>
-        <p:spPr>
-          <a:xfrm>
-            <a:off x="1143000" y="685800"/>
-            <a:ext cx="4572000" cy="3429000"/>
-          </a:xfrm>
-          <a:custGeom>
-            <a:avLst/>
-            <a:gdLst/>
-            <a:ahLst/>
-            <a:cxnLst/>
-            <a:rect l="0" t="0" r="0" b="0"/>
-            <a:pathLst>
-              <a:path w="120000" h="120000" extrusionOk="0">
-                <a:moveTo>
-                  <a:pt x="0" y="0"/>
-                </a:moveTo>
-                <a:lnTo>
-                  <a:pt x="120000" y="0"/>
-                </a:lnTo>
-                <a:lnTo>
-                  <a:pt x="120000" y="120000"/>
-                </a:lnTo>
-                <a:lnTo>
-                  <a:pt x="0" y="120000"/>
-                </a:lnTo>
-                <a:close/>
-              </a:path>
-            </a:pathLst>
-          </a:custGeom>
-        </p:spPr>
-      </p:sp>
-    </p:spTree>
-  </p:cSld>
-  <p:clrMapOvr>
-    <a:masterClrMapping/>
-  </p:clrMapOvr>
-</p:notes>
-</file>
-
-<file path=ppt/notesSlides/notesSlide45.xml><?xml version="1.0" encoding="utf-8"?>
-<p:notes xmlns:a="http://schemas.openxmlformats.org/drawingml/2006/main" xmlns:r="http://schemas.openxmlformats.org/officeDocument/2006/relationships" xmlns:p="http://schemas.openxmlformats.org/presentationml/2006/main" showMasterSp="0" showMasterPhAnim="0">
-  <p:cSld>
-    <p:spTree>
-      <p:nvGrpSpPr>
-        <p:cNvPr id="1" name="Shape 424"/>
-        <p:cNvGrpSpPr/>
-        <p:nvPr/>
-      </p:nvGrpSpPr>
-      <p:grpSpPr>
-        <a:xfrm>
-          <a:off x="0" y="0"/>
-          <a:ext cx="0" cy="0"/>
-          <a:chOff x="0" y="0"/>
-          <a:chExt cx="0" cy="0"/>
-        </a:xfrm>
-      </p:grpSpPr>
-      <p:sp>
-        <p:nvSpPr>
-          <p:cNvPr id="425" name="Shape 425"/>
-          <p:cNvSpPr txBox="1">
-            <a:spLocks noGrp="1"/>
-          </p:cNvSpPr>
-          <p:nvPr>
-            <p:ph type="body" idx="1"/>
-          </p:nvPr>
-        </p:nvSpPr>
-        <p:spPr>
-          <a:xfrm>
-            <a:off x="685511" y="4343235"/>
-            <a:ext cx="5486975" cy="4115143"/>
-          </a:xfrm>
-          <a:prstGeom prst="rect">
-            <a:avLst/>
-          </a:prstGeom>
-          <a:noFill/>
-          <a:ln>
-            <a:noFill/>
-          </a:ln>
-        </p:spPr>
-        <p:txBody>
-          <a:bodyPr lIns="81350" tIns="81350" rIns="81350" bIns="81350" anchor="ctr" anchorCtr="0">
-            <a:noAutofit/>
-          </a:bodyPr>
-          <a:lstStyle/>
-          <a:p>
-            <a:pPr lvl="0">
-              <a:spcBef>
-                <a:spcPts val="0"/>
-              </a:spcBef>
-              <a:buNone/>
-            </a:pPr>
-            <a:endParaRPr/>
-          </a:p>
-        </p:txBody>
-      </p:sp>
-      <p:sp>
-        <p:nvSpPr>
-          <p:cNvPr id="426" name="Shape 426"/>
           <p:cNvSpPr>
             <a:spLocks noGrp="1" noRot="1" noChangeAspect="1"/>
           </p:cNvSpPr>
@@ -15662,6 +15556,18 @@
               <a:buNone/>
             </a:pPr>
             <a:r>
+              <a:rPr lang="en" sz="2000" dirty="0" err="1">
+                <a:solidFill>
+                  <a:schemeClr val="lt1"/>
+                </a:solidFill>
+                <a:latin typeface="Calibri"/>
+                <a:ea typeface="Calibri"/>
+                <a:cs typeface="Calibri"/>
+                <a:sym typeface="Calibri"/>
+              </a:rPr>
+              <a:t>Flink</a:t>
+            </a:r>
+            <a:r>
               <a:rPr lang="en" sz="2000" dirty="0">
                 <a:solidFill>
                   <a:schemeClr val="lt1"/>
@@ -15671,7 +15577,7 @@
                 <a:cs typeface="Calibri"/>
                 <a:sym typeface="Calibri"/>
               </a:rPr>
-              <a:t>Flink </a:t>
+              <a:t> </a:t>
             </a:r>
             <a:r>
               <a:rPr lang="en" sz="2000" dirty="0" smtClean="0">
@@ -15686,6 +15592,42 @@
               <a:t>v1.</a:t>
             </a:r>
             <a:r>
+              <a:rPr lang="en-US" sz="2000" dirty="0">
+                <a:solidFill>
+                  <a:schemeClr val="lt1"/>
+                </a:solidFill>
+                <a:latin typeface="Calibri"/>
+                <a:ea typeface="Calibri"/>
+                <a:cs typeface="Calibri"/>
+                <a:sym typeface="Calibri"/>
+              </a:rPr>
+              <a:t>3</a:t>
+            </a:r>
+            <a:r>
+              <a:rPr lang="en" sz="2000" dirty="0" smtClean="0">
+                <a:solidFill>
+                  <a:schemeClr val="lt1"/>
+                </a:solidFill>
+                <a:latin typeface="Calibri"/>
+                <a:ea typeface="Calibri"/>
+                <a:cs typeface="Calibri"/>
+                <a:sym typeface="Calibri"/>
+              </a:rPr>
+              <a:t> </a:t>
+            </a:r>
+            <a:r>
+              <a:rPr lang="en" sz="2000" dirty="0">
+                <a:solidFill>
+                  <a:schemeClr val="lt1"/>
+                </a:solidFill>
+                <a:latin typeface="Calibri"/>
+                <a:ea typeface="Calibri"/>
+                <a:cs typeface="Calibri"/>
+                <a:sym typeface="Calibri"/>
+              </a:rPr>
+              <a:t>– </a:t>
+            </a:r>
+            <a:r>
               <a:rPr lang="en-US" sz="2000" dirty="0" smtClean="0">
                 <a:solidFill>
                   <a:schemeClr val="lt1"/>
@@ -15695,10 +15637,10 @@
                 <a:cs typeface="Calibri"/>
                 <a:sym typeface="Calibri"/>
               </a:rPr>
-              <a:t>2</a:t>
-            </a:r>
-            <a:r>
-              <a:rPr lang="en" sz="2000" dirty="0" smtClean="0">
+              <a:t>19</a:t>
+            </a:r>
+            <a:r>
+              <a:rPr lang="en-US" sz="2000" dirty="0" smtClean="0">
                 <a:solidFill>
                   <a:schemeClr val="lt1"/>
                 </a:solidFill>
@@ -15707,31 +15649,7 @@
                 <a:cs typeface="Calibri"/>
                 <a:sym typeface="Calibri"/>
               </a:rPr>
-              <a:t> </a:t>
-            </a:r>
-            <a:r>
-              <a:rPr lang="en" sz="2000" dirty="0">
-                <a:solidFill>
-                  <a:schemeClr val="lt1"/>
-                </a:solidFill>
-                <a:latin typeface="Calibri"/>
-                <a:ea typeface="Calibri"/>
-                <a:cs typeface="Calibri"/>
-                <a:sym typeface="Calibri"/>
-              </a:rPr>
-              <a:t>– </a:t>
-            </a:r>
-            <a:r>
-              <a:rPr lang="en-US" sz="2000" dirty="0" smtClean="0">
-                <a:solidFill>
-                  <a:schemeClr val="lt1"/>
-                </a:solidFill>
-                <a:latin typeface="Calibri"/>
-                <a:ea typeface="Calibri"/>
-                <a:cs typeface="Calibri"/>
-                <a:sym typeface="Calibri"/>
-              </a:rPr>
-              <a:t>27.02.</a:t>
+              <a:t>.06.</a:t>
             </a:r>
             <a:r>
               <a:rPr lang="en" sz="2000" dirty="0" smtClean="0">
@@ -16133,6 +16051,42 @@
               </a:rPr>
               <a:t>StreamExecutionEnvironment env = 				    		</a:t>
             </a:r>
+            <a:r>
+              <a:rPr lang="en" sz="1400" b="0" strike="noStrike" dirty="0" err="1" smtClean="0">
+                <a:solidFill>
+                  <a:srgbClr val="000000"/>
+                </a:solidFill>
+                <a:latin typeface="Consolas"/>
+                <a:ea typeface="Consolas"/>
+                <a:cs typeface="Consolas"/>
+                <a:sym typeface="Consolas"/>
+              </a:rPr>
+              <a:t>StreamExecutionEnvironment.</a:t>
+            </a:r>
+            <a:r>
+              <a:rPr lang="en" sz="1400" b="0" i="1" strike="noStrike" dirty="0" err="1" smtClean="0">
+                <a:solidFill>
+                  <a:srgbClr val="000000"/>
+                </a:solidFill>
+                <a:latin typeface="Consolas"/>
+                <a:ea typeface="Consolas"/>
+                <a:cs typeface="Consolas"/>
+                <a:sym typeface="Consolas"/>
+              </a:rPr>
+              <a:t>getExecutionEnvironment</a:t>
+            </a:r>
+            <a:r>
+              <a:rPr lang="en" sz="1400" b="0" strike="noStrike" dirty="0">
+                <a:solidFill>
+                  <a:srgbClr val="000000"/>
+                </a:solidFill>
+                <a:latin typeface="Consolas"/>
+                <a:ea typeface="Consolas"/>
+                <a:cs typeface="Consolas"/>
+                <a:sym typeface="Consolas"/>
+              </a:rPr>
+              <a:t>();</a:t>
+            </a:r>
           </a:p>
           <a:p>
             <a:pPr marL="0" marR="0" lvl="0" indent="0" algn="l" rtl="0">
@@ -16155,32 +16109,17 @@
                 <a:cs typeface="Consolas"/>
                 <a:sym typeface="Consolas"/>
               </a:rPr>
-              <a:t>		StreamExecutionEnvironment.</a:t>
-            </a:r>
-            <a:r>
-              <a:rPr lang="en" sz="1400" b="0" i="1" strike="noStrike" dirty="0">
-                <a:solidFill>
-                  <a:srgbClr val="000000"/>
-                </a:solidFill>
-                <a:latin typeface="Consolas"/>
-                <a:ea typeface="Consolas"/>
-                <a:cs typeface="Consolas"/>
-                <a:sym typeface="Consolas"/>
-              </a:rPr>
-              <a:t>getExecutionEnvironment</a:t>
-            </a:r>
-            <a:r>
-              <a:rPr lang="en" sz="1400" b="0" strike="noStrike" dirty="0">
-                <a:solidFill>
-                  <a:srgbClr val="000000"/>
-                </a:solidFill>
-                <a:latin typeface="Consolas"/>
-                <a:ea typeface="Consolas"/>
-                <a:cs typeface="Consolas"/>
-                <a:sym typeface="Consolas"/>
-              </a:rPr>
-              <a:t>();</a:t>
-            </a:r>
+              <a:t>    </a:t>
+            </a:r>
+            <a:endParaRPr lang="en-US" sz="1400" b="0" strike="noStrike" dirty="0" smtClean="0">
+              <a:solidFill>
+                <a:srgbClr val="000000"/>
+              </a:solidFill>
+              <a:latin typeface="Consolas"/>
+              <a:ea typeface="Consolas"/>
+              <a:cs typeface="Consolas"/>
+              <a:sym typeface="Consolas"/>
+            </a:endParaRPr>
           </a:p>
           <a:p>
             <a:pPr marL="0" marR="0" lvl="0" indent="0" algn="l" rtl="0">
@@ -16194,16 +16133,25 @@
               <a:buNone/>
             </a:pPr>
             <a:r>
-              <a:rPr lang="en" sz="1400" b="0" strike="noStrike" dirty="0">
-                <a:solidFill>
-                  <a:srgbClr val="000000"/>
-                </a:solidFill>
-                <a:latin typeface="Consolas"/>
-                <a:ea typeface="Consolas"/>
-                <a:cs typeface="Consolas"/>
-                <a:sym typeface="Consolas"/>
-              </a:rPr>
-              <a:t>    </a:t>
+              <a:rPr lang="en-US" i="1" dirty="0" smtClean="0">
+                <a:latin typeface="Consolas"/>
+                <a:ea typeface="Consolas"/>
+                <a:cs typeface="Consolas"/>
+                <a:sym typeface="Consolas"/>
+              </a:rPr>
+              <a:t>    </a:t>
+            </a:r>
+            <a:r>
+              <a:rPr lang="en" sz="1400" b="0" i="1" strike="noStrike" dirty="0" smtClean="0">
+                <a:solidFill>
+                  <a:srgbClr val="808080"/>
+                </a:solidFill>
+                <a:latin typeface="Consolas"/>
+                <a:ea typeface="Consolas"/>
+                <a:cs typeface="Consolas"/>
+                <a:sym typeface="Consolas"/>
+              </a:rPr>
+              <a:t>// </a:t>
             </a:r>
             <a:r>
               <a:rPr lang="en" sz="1400" b="0" i="1" strike="noStrike" dirty="0">
@@ -16215,7 +16163,7 @@
                 <a:cs typeface="Consolas"/>
                 <a:sym typeface="Consolas"/>
               </a:rPr>
-              <a:t>// configure event time</a:t>
+              <a:t>configure event time</a:t>
             </a:r>
             <a:r>
               <a:rPr lang="en" sz="1400" b="0" i="1" strike="noStrike" dirty="0">
@@ -17603,6 +17551,51 @@
               </a:rPr>
               <a:t>StreamExecutionEnvironment env = 				    		</a:t>
             </a:r>
+            <a:r>
+              <a:rPr lang="en" sz="1400" b="0" strike="noStrike" dirty="0" err="1" smtClean="0">
+                <a:solidFill>
+                  <a:srgbClr val="000000"/>
+                </a:solidFill>
+                <a:latin typeface="Consolas"/>
+                <a:ea typeface="Consolas"/>
+                <a:cs typeface="Consolas"/>
+                <a:sym typeface="Consolas"/>
+              </a:rPr>
+              <a:t>StreamExecutionEnvironment.</a:t>
+            </a:r>
+            <a:r>
+              <a:rPr lang="en" sz="1400" b="0" i="1" strike="noStrike" dirty="0" err="1" smtClean="0">
+                <a:solidFill>
+                  <a:srgbClr val="000000"/>
+                </a:solidFill>
+                <a:latin typeface="Consolas"/>
+                <a:ea typeface="Consolas"/>
+                <a:cs typeface="Consolas"/>
+                <a:sym typeface="Consolas"/>
+              </a:rPr>
+              <a:t>getExecutionEnvironment</a:t>
+            </a:r>
+            <a:r>
+              <a:rPr lang="en" sz="1400" b="0" strike="noStrike" dirty="0" smtClean="0">
+                <a:solidFill>
+                  <a:srgbClr val="000000"/>
+                </a:solidFill>
+                <a:latin typeface="Consolas"/>
+                <a:ea typeface="Consolas"/>
+                <a:cs typeface="Consolas"/>
+                <a:sym typeface="Consolas"/>
+              </a:rPr>
+              <a:t>();</a:t>
+            </a:r>
+            <a:endParaRPr lang="en-US" sz="1400" b="0" strike="noStrike" dirty="0" smtClean="0">
+              <a:solidFill>
+                <a:srgbClr val="000000"/>
+              </a:solidFill>
+              <a:latin typeface="Consolas"/>
+              <a:ea typeface="Consolas"/>
+              <a:cs typeface="Consolas"/>
+              <a:sym typeface="Consolas"/>
+            </a:endParaRPr>
           </a:p>
           <a:p>
             <a:pPr marL="0" marR="0" lvl="0" indent="0" algn="l" rtl="0">
@@ -17615,42 +17608,15 @@
               <a:buSzPct val="25000"/>
               <a:buNone/>
             </a:pPr>
-            <a:r>
-              <a:rPr lang="en" sz="1400" b="0" strike="noStrike" dirty="0">
-                <a:solidFill>
-                  <a:srgbClr val="000000"/>
-                </a:solidFill>
-                <a:latin typeface="Consolas"/>
-                <a:ea typeface="Consolas"/>
-                <a:cs typeface="Consolas"/>
-                <a:sym typeface="Consolas"/>
-              </a:rPr>
-              <a:t>		StreamExecutionEnvironment.</a:t>
-            </a:r>
-            <a:r>
-              <a:rPr lang="en" sz="1400" b="0" i="1" strike="noStrike" dirty="0">
-                <a:solidFill>
-                  <a:srgbClr val="000000"/>
-                </a:solidFill>
-                <a:latin typeface="Consolas"/>
-                <a:ea typeface="Consolas"/>
-                <a:cs typeface="Consolas"/>
-                <a:sym typeface="Consolas"/>
-              </a:rPr>
-              <a:t>getExecutionEnvironment</a:t>
-            </a:r>
-            <a:r>
-              <a:rPr lang="en" sz="1400" b="0" strike="noStrike" dirty="0">
-                <a:solidFill>
-                  <a:srgbClr val="000000"/>
-                </a:solidFill>
-                <a:latin typeface="Consolas"/>
-                <a:ea typeface="Consolas"/>
-                <a:cs typeface="Consolas"/>
-                <a:sym typeface="Consolas"/>
-              </a:rPr>
-              <a:t>();</a:t>
-            </a:r>
+            <a:endParaRPr lang="en" sz="1400" b="0" strike="noStrike" dirty="0">
+              <a:solidFill>
+                <a:srgbClr val="000000"/>
+              </a:solidFill>
+              <a:latin typeface="Consolas"/>
+              <a:ea typeface="Consolas"/>
+              <a:cs typeface="Consolas"/>
+              <a:sym typeface="Consolas"/>
+            </a:endParaRPr>
           </a:p>
           <a:p>
             <a:pPr marL="0" marR="0" lvl="0" indent="0" algn="l" rtl="0">
@@ -23014,16 +22980,28 @@
               <a:buChar char="▪"/>
             </a:pPr>
             <a:r>
-              <a:rPr lang="en" sz="2400" b="0" strike="noStrike">
-                <a:solidFill>
-                  <a:srgbClr val="000000"/>
-                </a:solidFill>
-                <a:latin typeface="Calibri"/>
-                <a:ea typeface="Calibri"/>
-                <a:cs typeface="Calibri"/>
-                <a:sym typeface="Calibri"/>
-              </a:rPr>
-              <a:t>Flink aims to be able to process data of any type</a:t>
+              <a:rPr lang="en" sz="2400" b="0" strike="noStrike" dirty="0" err="1">
+                <a:solidFill>
+                  <a:srgbClr val="000000"/>
+                </a:solidFill>
+                <a:latin typeface="Calibri"/>
+                <a:ea typeface="Calibri"/>
+                <a:cs typeface="Calibri"/>
+                <a:sym typeface="Calibri"/>
+              </a:rPr>
+              <a:t>Flink</a:t>
+            </a:r>
+            <a:r>
+              <a:rPr lang="en" sz="2400" b="0" strike="noStrike" dirty="0">
+                <a:solidFill>
+                  <a:srgbClr val="000000"/>
+                </a:solidFill>
+                <a:latin typeface="Calibri"/>
+                <a:ea typeface="Calibri"/>
+                <a:cs typeface="Calibri"/>
+                <a:sym typeface="Calibri"/>
+              </a:rPr>
+              <a:t> aims to be able to process data of any type</a:t>
             </a:r>
           </a:p>
           <a:p>
@@ -23037,7 +23015,7 @@
               <a:buFont typeface="Noto Sans Symbols"/>
               <a:buNone/>
             </a:pPr>
-            <a:endParaRPr sz="2400" b="0" i="0" u="none" strike="noStrike" cap="none">
+            <a:endParaRPr sz="2400" b="0" i="0" u="none" strike="noStrike" cap="none" dirty="0">
               <a:solidFill>
                 <a:schemeClr val="dk1"/>
               </a:solidFill>
@@ -23060,16 +23038,28 @@
               <a:buChar char="▪"/>
             </a:pPr>
             <a:r>
-              <a:rPr lang="en" sz="2400" b="0" i="0" u="none" strike="noStrike" cap="none">
-                <a:solidFill>
-                  <a:srgbClr val="000000"/>
-                </a:solidFill>
-                <a:latin typeface="Calibri"/>
-                <a:ea typeface="Calibri"/>
-                <a:cs typeface="Calibri"/>
-                <a:sym typeface="Calibri"/>
-              </a:rPr>
-              <a:t>DataSet and DataStream APIs share the same type system</a:t>
+              <a:rPr lang="en" sz="2400" b="0" i="0" u="none" strike="noStrike" cap="none" dirty="0" err="1">
+                <a:solidFill>
+                  <a:srgbClr val="000000"/>
+                </a:solidFill>
+                <a:latin typeface="Calibri"/>
+                <a:ea typeface="Calibri"/>
+                <a:cs typeface="Calibri"/>
+                <a:sym typeface="Calibri"/>
+              </a:rPr>
+              <a:t>DataSet</a:t>
+            </a:r>
+            <a:r>
+              <a:rPr lang="en" sz="2400" b="0" i="0" u="none" strike="noStrike" cap="none" dirty="0">
+                <a:solidFill>
+                  <a:srgbClr val="000000"/>
+                </a:solidFill>
+                <a:latin typeface="Calibri"/>
+                <a:ea typeface="Calibri"/>
+                <a:cs typeface="Calibri"/>
+                <a:sym typeface="Calibri"/>
+              </a:rPr>
+              <a:t> and DataStream APIs share the same type system</a:t>
             </a:r>
           </a:p>
           <a:p>
@@ -23083,7 +23073,7 @@
               <a:buFont typeface="Noto Sans Symbols"/>
               <a:buNone/>
             </a:pPr>
-            <a:endParaRPr sz="2400" b="0" i="0" u="none" strike="noStrike" cap="none">
+            <a:endParaRPr sz="2400" b="0" i="0" u="none" strike="noStrike" cap="none" dirty="0">
               <a:solidFill>
                 <a:schemeClr val="dk1"/>
               </a:solidFill>
@@ -23109,7 +23099,7 @@
               <a:buChar char="▪"/>
             </a:pPr>
             <a:r>
-              <a:rPr lang="en" sz="2400" b="0" strike="noStrike">
+              <a:rPr lang="en" sz="2400" b="0" strike="noStrike" dirty="0">
                 <a:solidFill>
                   <a:srgbClr val="000000"/>
                 </a:solidFill>
@@ -23137,7 +23127,7 @@
               <a:buChar char="▪"/>
             </a:pPr>
             <a:r>
-              <a:rPr lang="en" sz="2000" b="0" i="0" u="none" strike="noStrike" cap="none">
+              <a:rPr lang="en" sz="2000" b="0" i="0" u="none" strike="noStrike" cap="none" dirty="0">
                 <a:solidFill>
                   <a:srgbClr val="000000"/>
                 </a:solidFill>
@@ -23165,7 +23155,7 @@
               <a:buChar char="▪"/>
             </a:pPr>
             <a:r>
-              <a:rPr lang="en" sz="2000" b="0" i="0" u="none" strike="noStrike" cap="none">
+              <a:rPr lang="en" sz="2000" b="0" i="0" u="none" strike="noStrike" cap="none" dirty="0">
                 <a:solidFill>
                   <a:srgbClr val="000000"/>
                 </a:solidFill>
@@ -23188,7 +23178,7 @@
               <a:buFont typeface="Arial"/>
               <a:buNone/>
             </a:pPr>
-            <a:endParaRPr sz="2400" b="0" strike="noStrike">
+            <a:endParaRPr sz="2400" b="0" strike="noStrike" dirty="0">
               <a:solidFill>
                 <a:schemeClr val="dk1"/>
               </a:solidFill>
@@ -23214,7 +23204,7 @@
               <a:buChar char="▪"/>
             </a:pPr>
             <a:r>
-              <a:rPr lang="en" sz="2400" b="0" strike="noStrike">
+              <a:rPr lang="en" sz="2400" b="0" strike="noStrike" dirty="0">
                 <a:solidFill>
                   <a:srgbClr val="000000"/>
                 </a:solidFill>
@@ -23242,7 +23232,7 @@
               <a:buChar char="▪"/>
             </a:pPr>
             <a:r>
-              <a:rPr lang="en" sz="2000" b="0" i="0" u="none" strike="noStrike" cap="none">
+              <a:rPr lang="en" sz="2000" b="0" i="0" u="none" strike="noStrike" cap="none" dirty="0">
                 <a:solidFill>
                   <a:srgbClr val="000000"/>
                 </a:solidFill>
@@ -23270,7 +23260,7 @@
               <a:buChar char="▪"/>
             </a:pPr>
             <a:r>
-              <a:rPr lang="en" sz="2000" b="0" i="0" u="none" strike="noStrike" cap="none">
+              <a:rPr lang="en" sz="2000" b="0" i="0" u="none" strike="noStrike" cap="none" dirty="0">
                 <a:solidFill>
                   <a:srgbClr val="000000"/>
                 </a:solidFill>
@@ -23298,7 +23288,7 @@
               <a:buChar char="▪"/>
             </a:pPr>
             <a:r>
-              <a:rPr lang="en" sz="2000" b="0" i="0" u="none" strike="noStrike" cap="none">
+              <a:rPr lang="en" sz="2000" b="0" i="0" u="none" strike="noStrike" cap="none" dirty="0">
                 <a:solidFill>
                   <a:srgbClr val="000000"/>
                 </a:solidFill>
@@ -25141,7 +25131,31 @@
                 <a:cs typeface="Calibri"/>
                 <a:sym typeface="Calibri"/>
               </a:rPr>
-              <a:t>All examples here in Java for Flink </a:t>
+              <a:t>All examples here in Java for </a:t>
+            </a:r>
+            <a:r>
+              <a:rPr lang="en" sz="3200" b="0" strike="noStrike" dirty="0" err="1">
+                <a:solidFill>
+                  <a:srgbClr val="000000"/>
+                </a:solidFill>
+                <a:latin typeface="Calibri"/>
+                <a:ea typeface="Calibri"/>
+                <a:cs typeface="Calibri"/>
+                <a:sym typeface="Calibri"/>
+              </a:rPr>
+              <a:t>Flink</a:t>
+            </a:r>
+            <a:r>
+              <a:rPr lang="en" sz="3200" b="0" strike="noStrike" dirty="0">
+                <a:solidFill>
+                  <a:srgbClr val="000000"/>
+                </a:solidFill>
+                <a:latin typeface="Calibri"/>
+                <a:ea typeface="Calibri"/>
+                <a:cs typeface="Calibri"/>
+                <a:sym typeface="Calibri"/>
+              </a:rPr>
+              <a:t> </a:t>
             </a:r>
             <a:r>
               <a:rPr lang="en" sz="3200" b="0" strike="noStrike" dirty="0" smtClean="0">
@@ -25156,16 +25170,13 @@
               <a:t>1.</a:t>
             </a:r>
             <a:r>
-              <a:rPr lang="en-US" sz="3200" b="0" strike="noStrike" dirty="0" smtClean="0">
-                <a:solidFill>
-                  <a:srgbClr val="000000"/>
-                </a:solidFill>
-                <a:latin typeface="Calibri"/>
-                <a:ea typeface="Calibri"/>
-                <a:cs typeface="Calibri"/>
-                <a:sym typeface="Calibri"/>
-              </a:rPr>
-              <a:t>2</a:t>
+              <a:rPr lang="en-US" sz="3200" dirty="0">
+                <a:latin typeface="Calibri"/>
+                <a:ea typeface="Calibri"/>
+                <a:cs typeface="Calibri"/>
+                <a:sym typeface="Calibri"/>
+              </a:rPr>
+              <a:t>3</a:t>
             </a:r>
             <a:endParaRPr lang="en" sz="3200" b="0" strike="noStrike" dirty="0">
               <a:solidFill>
@@ -28586,7 +28597,7 @@
               <a:buNone/>
             </a:pPr>
             <a:r>
-              <a:rPr lang="en" sz="1600" b="0" strike="noStrike">
+              <a:rPr lang="en" sz="1600" b="0" strike="noStrike" dirty="0">
                 <a:solidFill>
                   <a:srgbClr val="6D6D6D"/>
                 </a:solidFill>
@@ -28610,7 +28621,7 @@
               <a:buNone/>
             </a:pPr>
             <a:r>
-              <a:rPr lang="en" sz="1600" b="0" strike="noStrike">
+              <a:rPr lang="en" sz="1600" b="0" strike="noStrike" dirty="0">
                 <a:solidFill>
                   <a:srgbClr val="000000"/>
                 </a:solidFill>
@@ -28632,7 +28643,7 @@
               </a:spcBef>
               <a:buNone/>
             </a:pPr>
-            <a:endParaRPr sz="1600" b="0" strike="noStrike">
+            <a:endParaRPr sz="1600" b="0" strike="noStrike" dirty="0">
               <a:solidFill>
                 <a:schemeClr val="dk1"/>
               </a:solidFill>
@@ -28654,7 +28665,7 @@
               <a:buNone/>
             </a:pPr>
             <a:r>
-              <a:rPr lang="en" sz="1600" b="0" strike="noStrike">
+              <a:rPr lang="en" sz="1600" b="0" strike="noStrike" dirty="0">
                 <a:solidFill>
                   <a:srgbClr val="6D6D6D"/>
                 </a:solidFill>
@@ -28678,19 +28689,64 @@
               <a:buNone/>
             </a:pPr>
             <a:r>
-              <a:rPr lang="en" sz="1600" b="0" strike="noStrike">
-                <a:solidFill>
-                  <a:srgbClr val="000000"/>
-                </a:solidFill>
-                <a:latin typeface="Consolas"/>
-                <a:ea typeface="Consolas"/>
-                <a:cs typeface="Consolas"/>
-                <a:sym typeface="Consolas"/>
-              </a:rPr>
-              <a:t>DataStream&lt;Integer, Integer&gt; grouped = passengers.</a:t>
-            </a:r>
-            <a:r>
-              <a:rPr lang="en" sz="1600" b="0" strike="noStrike">
+              <a:rPr lang="en-US" sz="1600" dirty="0" smtClean="0">
+                <a:latin typeface="Consolas"/>
+                <a:ea typeface="Consolas"/>
+                <a:cs typeface="Consolas"/>
+                <a:sym typeface="Consolas"/>
+              </a:rPr>
+              <a:t>DataStream&lt;Tuple2&lt;String, Integer&gt;</a:t>
+            </a:r>
+            <a:r>
+              <a:rPr lang="en-US" sz="1600" b="0" strike="noStrike" dirty="0" smtClean="0">
+                <a:solidFill>
+                  <a:srgbClr val="000000"/>
+                </a:solidFill>
+                <a:latin typeface="Consolas"/>
+                <a:ea typeface="Consolas"/>
+                <a:cs typeface="Consolas"/>
+                <a:sym typeface="Consolas"/>
+              </a:rPr>
+              <a:t>&gt;</a:t>
+            </a:r>
+            <a:r>
+              <a:rPr lang="en" sz="1600" b="0" strike="noStrike" dirty="0" smtClean="0">
+                <a:solidFill>
+                  <a:srgbClr val="000000"/>
+                </a:solidFill>
+                <a:latin typeface="Consolas"/>
+                <a:ea typeface="Consolas"/>
+                <a:cs typeface="Consolas"/>
+                <a:sym typeface="Consolas"/>
+              </a:rPr>
+              <a:t> </a:t>
+            </a:r>
+            <a:r>
+              <a:rPr lang="en" sz="1600" b="0" strike="noStrike" dirty="0">
+                <a:solidFill>
+                  <a:srgbClr val="000000"/>
+                </a:solidFill>
+                <a:latin typeface="Consolas"/>
+                <a:ea typeface="Consolas"/>
+                <a:cs typeface="Consolas"/>
+                <a:sym typeface="Consolas"/>
+              </a:rPr>
+              <a:t>grouped = </a:t>
+            </a:r>
+            <a:r>
+              <a:rPr lang="en" sz="1600" b="0" strike="noStrike" dirty="0" err="1">
+                <a:solidFill>
+                  <a:srgbClr val="000000"/>
+                </a:solidFill>
+                <a:latin typeface="Consolas"/>
+                <a:ea typeface="Consolas"/>
+                <a:cs typeface="Consolas"/>
+                <a:sym typeface="Consolas"/>
+              </a:rPr>
+              <a:t>passengers.</a:t>
+            </a:r>
+            <a:r>
+              <a:rPr lang="en" sz="1600" b="0" strike="noStrike" dirty="0" err="1">
                 <a:solidFill>
                   <a:srgbClr val="FF0000"/>
                 </a:solidFill>
@@ -28702,7 +28758,7 @@
               <a:t>keyBy</a:t>
             </a:r>
             <a:r>
-              <a:rPr lang="en" sz="1600" b="0" strike="noStrike">
+              <a:rPr lang="en" sz="1600" b="0" strike="noStrike" dirty="0">
                 <a:solidFill>
                   <a:srgbClr val="000000"/>
                 </a:solidFill>
@@ -28714,7 +28770,7 @@
               <a:t>(</a:t>
             </a:r>
             <a:r>
-              <a:rPr lang="en" sz="1600" b="0" strike="noStrike">
+              <a:rPr lang="en" sz="1600" b="0" strike="noStrike" dirty="0">
                 <a:solidFill>
                   <a:srgbClr val="0000FF"/>
                 </a:solidFill>
@@ -28726,7 +28782,7 @@
               <a:t>1</a:t>
             </a:r>
             <a:r>
-              <a:rPr lang="en" sz="1600" b="0" strike="noStrike">
+              <a:rPr lang="en" sz="1600" b="0" strike="noStrike" dirty="0">
                 <a:solidFill>
                   <a:srgbClr val="000000"/>
                 </a:solidFill>
@@ -28748,7 +28804,7 @@
               </a:spcBef>
               <a:buNone/>
             </a:pPr>
-            <a:endParaRPr sz="1600" b="0" strike="noStrike">
+            <a:endParaRPr sz="1600" b="0" strike="noStrike" dirty="0">
               <a:solidFill>
                 <a:schemeClr val="dk1"/>
               </a:solidFill>
@@ -28768,7 +28824,7 @@
               </a:spcBef>
               <a:buNone/>
             </a:pPr>
-            <a:endParaRPr sz="1600" b="0" strike="noStrike">
+            <a:endParaRPr sz="1600" b="0" strike="noStrike" dirty="0">
               <a:solidFill>
                 <a:schemeClr val="dk1"/>
               </a:solidFill>
@@ -28818,7 +28874,7 @@
                         <a:buNone/>
                       </a:pPr>
                       <a:r>
-                        <a:rPr lang="en" sz="1200" b="0" strike="noStrike">
+                        <a:rPr lang="en" sz="1200" b="0" strike="noStrike" dirty="0">
                           <a:solidFill>
                             <a:srgbClr val="000000"/>
                           </a:solidFill>
@@ -28889,7 +28945,7 @@
                         <a:buNone/>
                       </a:pPr>
                       <a:r>
-                        <a:rPr lang="en" sz="1200" b="0" strike="noStrike">
+                        <a:rPr lang="en" sz="1200" b="0" strike="noStrike" dirty="0">
                           <a:solidFill>
                             <a:srgbClr val="000000"/>
                           </a:solidFill>
@@ -31891,7 +31947,7 @@
         </p:nvSpPr>
         <p:spPr>
           <a:xfrm>
-            <a:off x="457200" y="1474200"/>
+            <a:off x="457200" y="1292218"/>
             <a:ext cx="8443440" cy="5246640"/>
           </a:xfrm>
           <a:prstGeom prst="rect">
@@ -31920,16 +31976,52 @@
               <a:buChar char="▪"/>
             </a:pPr>
             <a:r>
-              <a:rPr lang="en" sz="3200" b="0" i="0" u="none" strike="noStrike" cap="none" dirty="0">
-                <a:solidFill>
-                  <a:srgbClr val="000000"/>
-                </a:solidFill>
-                <a:latin typeface="Calibri"/>
-                <a:ea typeface="Calibri"/>
-                <a:cs typeface="Calibri"/>
-                <a:sym typeface="Calibri"/>
-              </a:rPr>
-              <a:t>keyBy() partitions DataStreams on keys</a:t>
+              <a:rPr lang="en" sz="2800" b="0" i="0" u="none" strike="noStrike" cap="none" dirty="0" err="1" smtClean="0">
+                <a:solidFill>
+                  <a:srgbClr val="000000"/>
+                </a:solidFill>
+                <a:latin typeface="Calibri"/>
+                <a:ea typeface="Calibri"/>
+                <a:cs typeface="Calibri"/>
+                <a:sym typeface="Calibri"/>
+              </a:rPr>
+              <a:t>keyBy</a:t>
+            </a:r>
+            <a:r>
+              <a:rPr lang="en" sz="2800" b="0" i="0" u="none" strike="noStrike" cap="none" dirty="0">
+                <a:solidFill>
+                  <a:srgbClr val="000000"/>
+                </a:solidFill>
+                <a:latin typeface="Calibri"/>
+                <a:ea typeface="Calibri"/>
+                <a:cs typeface="Calibri"/>
+                <a:sym typeface="Calibri"/>
+              </a:rPr>
+              <a:t>() partitions </a:t>
+            </a:r>
+            <a:r>
+              <a:rPr lang="en-US" sz="2800" b="0" i="0" u="none" strike="noStrike" cap="none" dirty="0" smtClean="0">
+                <a:solidFill>
+                  <a:srgbClr val="000000"/>
+                </a:solidFill>
+                <a:latin typeface="Calibri"/>
+                <a:ea typeface="Calibri"/>
+                <a:cs typeface="Calibri"/>
+                <a:sym typeface="Calibri"/>
+              </a:rPr>
+              <a:t>a </a:t>
+            </a:r>
+            <a:r>
+              <a:rPr lang="en" sz="2800" b="0" i="0" u="none" strike="noStrike" cap="none" dirty="0" smtClean="0">
+                <a:solidFill>
+                  <a:srgbClr val="000000"/>
+                </a:solidFill>
+                <a:latin typeface="Calibri"/>
+                <a:ea typeface="Calibri"/>
+                <a:cs typeface="Calibri"/>
+                <a:sym typeface="Calibri"/>
+              </a:rPr>
+              <a:t>DataStream</a:t>
             </a:r>
           </a:p>
           <a:p>
@@ -31942,54 +32034,63 @@
               <a:buChar char="▪"/>
             </a:pPr>
             <a:r>
-              <a:rPr lang="en-US" sz="2800" dirty="0">
-                <a:latin typeface="Calibri"/>
-                <a:ea typeface="Calibri"/>
-                <a:cs typeface="Calibri"/>
-                <a:sym typeface="Calibri"/>
-              </a:rPr>
-              <a:t>k</a:t>
-            </a:r>
-            <a:r>
-              <a:rPr lang="en" sz="2800" b="0" i="0" u="none" strike="noStrike" cap="none" dirty="0" smtClean="0">
-                <a:solidFill>
-                  <a:srgbClr val="000000"/>
-                </a:solidFill>
-                <a:latin typeface="Calibri"/>
-                <a:ea typeface="Calibri"/>
-                <a:cs typeface="Calibri"/>
-                <a:sym typeface="Calibri"/>
-              </a:rPr>
-              <a:t>eys </a:t>
-            </a:r>
-            <a:r>
-              <a:rPr lang="en" sz="2800" b="0" i="0" u="none" strike="noStrike" cap="none" dirty="0">
-                <a:solidFill>
-                  <a:srgbClr val="000000"/>
-                </a:solidFill>
-                <a:latin typeface="Calibri"/>
-                <a:ea typeface="Calibri"/>
-                <a:cs typeface="Calibri"/>
-                <a:sym typeface="Calibri"/>
-              </a:rPr>
-              <a:t>are extracted from each element</a:t>
-            </a:r>
-          </a:p>
-          <a:p>
-            <a:pPr marL="343080" marR="0" lvl="0" indent="-343080" algn="l" rtl="0">
-              <a:lnSpc>
-                <a:spcPct val="100000"/>
-              </a:lnSpc>
-              <a:spcBef>
-                <a:spcPts val="0"/>
-              </a:spcBef>
-              <a:buClr>
-                <a:srgbClr val="34AD91"/>
-              </a:buClr>
-              <a:buFont typeface="Noto Sans Symbols"/>
-              <a:buNone/>
-            </a:pPr>
-            <a:endParaRPr sz="3200" b="0" strike="noStrike" dirty="0">
+              <a:rPr lang="en-US" sz="2400" dirty="0" smtClean="0">
+                <a:latin typeface="Calibri"/>
+                <a:ea typeface="Calibri"/>
+                <a:cs typeface="Calibri"/>
+                <a:sym typeface="Calibri"/>
+              </a:rPr>
+              <a:t>a k</a:t>
+            </a:r>
+            <a:r>
+              <a:rPr lang="en" sz="2400" b="0" i="0" u="none" strike="noStrike" cap="none" dirty="0" err="1" smtClean="0">
+                <a:solidFill>
+                  <a:srgbClr val="000000"/>
+                </a:solidFill>
+                <a:latin typeface="Calibri"/>
+                <a:ea typeface="Calibri"/>
+                <a:cs typeface="Calibri"/>
+                <a:sym typeface="Calibri"/>
+              </a:rPr>
+              <a:t>ey</a:t>
+            </a:r>
+            <a:r>
+              <a:rPr lang="en" sz="2400" b="0" i="0" u="none" strike="noStrike" cap="none" dirty="0" smtClean="0">
+                <a:solidFill>
+                  <a:srgbClr val="000000"/>
+                </a:solidFill>
+                <a:latin typeface="Calibri"/>
+                <a:ea typeface="Calibri"/>
+                <a:cs typeface="Calibri"/>
+                <a:sym typeface="Calibri"/>
+              </a:rPr>
+              <a:t> </a:t>
+            </a:r>
+            <a:r>
+              <a:rPr lang="en-US" sz="2400" b="0" i="0" u="none" strike="noStrike" cap="none" dirty="0" smtClean="0">
+                <a:solidFill>
+                  <a:srgbClr val="000000"/>
+                </a:solidFill>
+                <a:latin typeface="Calibri"/>
+                <a:ea typeface="Calibri"/>
+                <a:cs typeface="Calibri"/>
+                <a:sym typeface="Calibri"/>
+              </a:rPr>
+              <a:t>is </a:t>
+            </a:r>
+            <a:r>
+              <a:rPr lang="en" sz="2400" b="0" i="0" u="none" strike="noStrike" cap="none" dirty="0" smtClean="0">
+                <a:solidFill>
+                  <a:srgbClr val="000000"/>
+                </a:solidFill>
+                <a:latin typeface="Calibri"/>
+                <a:ea typeface="Calibri"/>
+                <a:cs typeface="Calibri"/>
+                <a:sym typeface="Calibri"/>
+              </a:rPr>
+              <a:t>extracted from each element</a:t>
+            </a:r>
+            <a:endParaRPr lang="en-US" sz="2400" b="0" i="0" u="none" strike="noStrike" cap="none" dirty="0" smtClean="0">
               <a:solidFill>
                 <a:srgbClr val="000000"/>
               </a:solidFill>
@@ -32010,69 +32111,235 @@
               <a:buClr>
                 <a:srgbClr val="34AD91"/>
               </a:buClr>
-              <a:buSzPct val="100000"/>
               <a:buFont typeface="Noto Sans Symbols"/>
-              <a:buChar char="▪"/>
-            </a:pPr>
-            <a:r>
-              <a:rPr lang="en" sz="3200" b="0" strike="noStrike" dirty="0">
-                <a:solidFill>
-                  <a:srgbClr val="000000"/>
-                </a:solidFill>
-                <a:latin typeface="Calibri"/>
-                <a:ea typeface="Calibri"/>
-                <a:cs typeface="Calibri"/>
-                <a:sym typeface="Calibri"/>
-              </a:rPr>
-              <a:t>Not all data types can be used as keys</a:t>
-            </a:r>
-          </a:p>
-          <a:p>
-            <a:pPr marL="743040" lvl="1" indent="-285840">
+              <a:buNone/>
+            </a:pPr>
+            <a:endParaRPr sz="2800" b="0" strike="noStrike" dirty="0">
+              <a:solidFill>
+                <a:srgbClr val="000000"/>
+              </a:solidFill>
+              <a:latin typeface="Calibri"/>
+              <a:ea typeface="Calibri"/>
+              <a:cs typeface="Calibri"/>
+              <a:sym typeface="Calibri"/>
+            </a:endParaRPr>
+          </a:p>
+          <a:p>
+            <a:pPr marL="343080" lvl="1" indent="-343080">
               <a:buClr>
                 <a:srgbClr val="34AD91"/>
               </a:buClr>
               <a:buSzPct val="100000"/>
+              <a:buFont typeface="Noto Sans Symbols"/>
+              <a:buChar char="▪"/>
+            </a:pPr>
+            <a:r>
+              <a:rPr lang="en-US" sz="2800" dirty="0">
+                <a:latin typeface="Calibri"/>
+                <a:ea typeface="Calibri"/>
+                <a:cs typeface="Calibri"/>
+                <a:sym typeface="Calibri"/>
+              </a:rPr>
+              <a:t>Basis of </a:t>
+            </a:r>
+            <a:r>
+              <a:rPr lang="en-US" sz="2800" dirty="0" smtClean="0">
+                <a:latin typeface="Calibri"/>
+                <a:ea typeface="Calibri"/>
+                <a:cs typeface="Calibri"/>
+                <a:sym typeface="Calibri"/>
+              </a:rPr>
+              <a:t>operating </a:t>
+            </a:r>
+            <a:r>
+              <a:rPr lang="en-US" sz="2800" dirty="0">
+                <a:latin typeface="Calibri"/>
+                <a:ea typeface="Calibri"/>
+                <a:cs typeface="Calibri"/>
+                <a:sym typeface="Calibri"/>
+              </a:rPr>
+              <a:t>in parallel</a:t>
+            </a:r>
+            <a:endParaRPr lang="en" sz="2800" dirty="0">
+              <a:latin typeface="Calibri"/>
+              <a:ea typeface="Calibri"/>
+              <a:cs typeface="Calibri"/>
+              <a:sym typeface="Calibri"/>
+            </a:endParaRPr>
+          </a:p>
+          <a:p>
+            <a:pPr marL="343080" lvl="1" indent="-343080">
+              <a:buClr>
+                <a:srgbClr val="34AD91"/>
+              </a:buClr>
+              <a:buSzPct val="100000"/>
+              <a:buFont typeface="Noto Sans Symbols"/>
+              <a:buChar char="▪"/>
+            </a:pPr>
+            <a:endParaRPr lang="en-US" sz="2800" dirty="0">
+              <a:latin typeface="Calibri"/>
+              <a:ea typeface="Calibri"/>
+              <a:cs typeface="Calibri"/>
+              <a:sym typeface="Calibri"/>
+            </a:endParaRPr>
+          </a:p>
+          <a:p>
+            <a:pPr marL="343080" marR="0" lvl="0" indent="-343080" algn="l" rtl="0">
+              <a:lnSpc>
+                <a:spcPct val="100000"/>
+              </a:lnSpc>
+              <a:spcBef>
+                <a:spcPts val="0"/>
+              </a:spcBef>
+              <a:buClr>
+                <a:srgbClr val="34AD91"/>
+              </a:buClr>
+              <a:buSzPct val="100000"/>
+              <a:buFont typeface="Noto Sans Symbols"/>
+              <a:buChar char="▪"/>
+            </a:pPr>
+            <a:r>
+              <a:rPr lang="en-US" sz="2800" b="0" strike="noStrike" dirty="0" smtClean="0">
+                <a:solidFill>
+                  <a:srgbClr val="000000"/>
+                </a:solidFill>
+                <a:latin typeface="Calibri"/>
+                <a:ea typeface="Calibri"/>
+                <a:cs typeface="Calibri"/>
+                <a:sym typeface="Calibri"/>
+              </a:rPr>
+              <a:t>Data </a:t>
+            </a:r>
+            <a:r>
+              <a:rPr lang="en" sz="2800" b="0" strike="noStrike" dirty="0" smtClean="0">
+                <a:solidFill>
+                  <a:srgbClr val="000000"/>
+                </a:solidFill>
+                <a:latin typeface="Calibri"/>
+                <a:ea typeface="Calibri"/>
+                <a:cs typeface="Calibri"/>
+                <a:sym typeface="Calibri"/>
+              </a:rPr>
+              <a:t>types used </a:t>
+            </a:r>
+            <a:r>
+              <a:rPr lang="en" sz="2800" b="0" strike="noStrike" dirty="0">
+                <a:solidFill>
+                  <a:srgbClr val="000000"/>
+                </a:solidFill>
+                <a:latin typeface="Calibri"/>
+                <a:ea typeface="Calibri"/>
+                <a:cs typeface="Calibri"/>
+                <a:sym typeface="Calibri"/>
+              </a:rPr>
+              <a:t>as </a:t>
+            </a:r>
+            <a:r>
+              <a:rPr lang="en" sz="2800" b="0" strike="noStrike" dirty="0" smtClean="0">
+                <a:solidFill>
+                  <a:srgbClr val="000000"/>
+                </a:solidFill>
+                <a:latin typeface="Calibri"/>
+                <a:ea typeface="Calibri"/>
+                <a:cs typeface="Calibri"/>
+                <a:sym typeface="Calibri"/>
+              </a:rPr>
+              <a:t>keys</a:t>
+            </a:r>
+            <a:r>
+              <a:rPr lang="en-US" sz="2800" b="0" strike="noStrike" dirty="0" smtClean="0">
+                <a:solidFill>
+                  <a:srgbClr val="000000"/>
+                </a:solidFill>
+                <a:latin typeface="Calibri"/>
+                <a:ea typeface="Calibri"/>
+                <a:cs typeface="Calibri"/>
+                <a:sym typeface="Calibri"/>
+              </a:rPr>
+              <a:t> must have valid implementations of </a:t>
+            </a:r>
+            <a:r>
+              <a:rPr lang="en-US" sz="2800" b="0" strike="noStrike" dirty="0" err="1" smtClean="0">
+                <a:solidFill>
+                  <a:srgbClr val="000000"/>
+                </a:solidFill>
+                <a:latin typeface="Consolas" charset="0"/>
+                <a:ea typeface="Consolas" charset="0"/>
+                <a:cs typeface="Consolas" charset="0"/>
+                <a:sym typeface="Calibri"/>
+              </a:rPr>
+              <a:t>hashCode</a:t>
+            </a:r>
+            <a:r>
+              <a:rPr lang="en-US" sz="2800" b="0" strike="noStrike" dirty="0" smtClean="0">
+                <a:solidFill>
+                  <a:srgbClr val="000000"/>
+                </a:solidFill>
+                <a:latin typeface="Consolas" charset="0"/>
+                <a:ea typeface="Consolas" charset="0"/>
+                <a:cs typeface="Consolas" charset="0"/>
+                <a:sym typeface="Calibri"/>
+              </a:rPr>
+              <a:t>()</a:t>
+            </a:r>
+            <a:r>
+              <a:rPr lang="en-US" sz="2800" b="0" strike="noStrike" dirty="0" smtClean="0">
+                <a:solidFill>
+                  <a:srgbClr val="000000"/>
+                </a:solidFill>
+                <a:latin typeface="Calibri"/>
+                <a:ea typeface="Calibri"/>
+                <a:cs typeface="Calibri"/>
+                <a:sym typeface="Calibri"/>
+              </a:rPr>
+              <a:t> and </a:t>
+            </a:r>
+            <a:r>
+              <a:rPr lang="en-US" sz="2800" b="0" strike="noStrike" dirty="0" smtClean="0">
+                <a:solidFill>
+                  <a:srgbClr val="000000"/>
+                </a:solidFill>
+                <a:latin typeface="Consolas" charset="0"/>
+                <a:ea typeface="Consolas" charset="0"/>
+                <a:cs typeface="Consolas" charset="0"/>
+                <a:sym typeface="Calibri"/>
+              </a:rPr>
+              <a:t>equals()</a:t>
+            </a:r>
+            <a:r>
+              <a:rPr lang="en-US" sz="2800" b="0" strike="noStrike" dirty="0" smtClean="0">
+                <a:solidFill>
+                  <a:srgbClr val="000000"/>
+                </a:solidFill>
+                <a:latin typeface="Calibri"/>
+                <a:ea typeface="Calibri"/>
+                <a:cs typeface="Calibri"/>
+                <a:sym typeface="Calibri"/>
+              </a:rPr>
+              <a:t>, which rules out arrays (for example)</a:t>
+            </a:r>
+            <a:endParaRPr lang="en" sz="2800" b="0" strike="noStrike" dirty="0">
+              <a:solidFill>
+                <a:srgbClr val="000000"/>
+              </a:solidFill>
+              <a:latin typeface="Calibri"/>
+              <a:ea typeface="Calibri"/>
+              <a:cs typeface="Calibri"/>
+              <a:sym typeface="Calibri"/>
+            </a:endParaRPr>
+          </a:p>
+          <a:p>
+            <a:pPr marL="743040" marR="0" lvl="1" indent="-285840" algn="l" rtl="0">
+              <a:spcBef>
+                <a:spcPts val="0"/>
+              </a:spcBef>
+              <a:buClr>
+                <a:srgbClr val="34AD91"/>
+              </a:buClr>
               <a:buFont typeface="Arial"/>
-              <a:buChar char="▪"/>
-            </a:pPr>
-            <a:r>
-              <a:rPr lang="en-US" sz="2800" dirty="0" smtClean="0">
-                <a:solidFill>
-                  <a:schemeClr val="dk1"/>
-                </a:solidFill>
-                <a:latin typeface="Calibri"/>
-                <a:ea typeface="Calibri"/>
-                <a:cs typeface="Calibri"/>
-                <a:sym typeface="Calibri"/>
-              </a:rPr>
-              <a:t>can’t use arrays as</a:t>
-            </a:r>
-            <a:r>
-              <a:rPr lang="en" sz="2800" dirty="0" smtClean="0">
-                <a:solidFill>
-                  <a:schemeClr val="dk1"/>
-                </a:solidFill>
-                <a:latin typeface="Calibri"/>
-                <a:ea typeface="Calibri"/>
-                <a:cs typeface="Calibri"/>
-                <a:sym typeface="Calibri"/>
-              </a:rPr>
-              <a:t> key</a:t>
-            </a:r>
-            <a:r>
-              <a:rPr lang="en-US" sz="2800" dirty="0" smtClean="0">
-                <a:solidFill>
-                  <a:schemeClr val="dk1"/>
-                </a:solidFill>
-                <a:latin typeface="Calibri"/>
-                <a:ea typeface="Calibri"/>
-                <a:cs typeface="Calibri"/>
-                <a:sym typeface="Calibri"/>
-              </a:rPr>
-              <a:t>s</a:t>
-            </a:r>
-            <a:endParaRPr lang="en" sz="2800" dirty="0">
+              <a:buNone/>
+            </a:pPr>
+            <a:endParaRPr sz="2400" b="0" i="0" u="none" strike="noStrike" cap="none" dirty="0" smtClean="0">
               <a:solidFill>
                 <a:schemeClr val="dk1"/>
               </a:solidFill>
@@ -32083,7 +32350,10 @@
             </a:endParaRPr>
           </a:p>
           <a:p>
-            <a:pPr marL="743040" lvl="1" indent="-285840">
+            <a:pPr marL="285840" marR="0" lvl="0" indent="-285840" algn="l" rtl="0">
+              <a:spcBef>
+                <a:spcPts val="0"/>
+              </a:spcBef>
               <a:buClr>
                 <a:srgbClr val="34AD91"/>
               </a:buClr>
@@ -32101,41 +32371,35 @@
                 <a:cs typeface="Calibri"/>
                 <a:sym typeface="Calibri"/>
               </a:rPr>
-              <a:t>key types must be comparable</a:t>
-            </a:r>
-            <a:endParaRPr lang="en" sz="2800" b="0" i="0" u="none" strike="noStrike" cap="none" dirty="0" smtClean="0">
-              <a:solidFill>
-                <a:schemeClr val="dk1"/>
-              </a:solidFill>
-              <a:latin typeface="Calibri"/>
-              <a:ea typeface="Calibri"/>
-              <a:cs typeface="Calibri"/>
-              <a:sym typeface="Calibri"/>
-            </a:endParaRPr>
+              <a:t>C</a:t>
+            </a:r>
+            <a:r>
+              <a:rPr lang="en" sz="2800" b="0" strike="noStrike" dirty="0" smtClean="0">
+                <a:solidFill>
+                  <a:schemeClr val="dk1"/>
+                </a:solidFill>
+                <a:latin typeface="Calibri"/>
+                <a:ea typeface="Calibri"/>
+                <a:cs typeface="Calibri"/>
+                <a:sym typeface="Calibri"/>
+              </a:rPr>
+              <a:t>omposite </a:t>
+            </a:r>
+            <a:r>
+              <a:rPr lang="en" sz="2800" b="0" strike="noStrike" dirty="0">
+                <a:solidFill>
+                  <a:schemeClr val="dk1"/>
+                </a:solidFill>
+                <a:latin typeface="Calibri"/>
+                <a:ea typeface="Calibri"/>
+                <a:cs typeface="Calibri"/>
+                <a:sym typeface="Calibri"/>
+              </a:rPr>
+              <a:t>types can be used as keys</a:t>
+            </a:r>
           </a:p>
           <a:p>
             <a:pPr marL="743040" marR="0" lvl="1" indent="-285840" algn="l" rtl="0">
-              <a:spcBef>
-                <a:spcPts val="0"/>
-              </a:spcBef>
-              <a:buClr>
-                <a:srgbClr val="34AD91"/>
-              </a:buClr>
-              <a:buFont typeface="Arial"/>
-              <a:buNone/>
-            </a:pPr>
-            <a:endParaRPr sz="2800" b="0" i="0" u="none" strike="noStrike" cap="none" dirty="0" smtClean="0">
-              <a:solidFill>
-                <a:schemeClr val="dk1"/>
-              </a:solidFill>
-              <a:latin typeface="Calibri"/>
-              <a:ea typeface="Calibri"/>
-              <a:cs typeface="Calibri"/>
-              <a:sym typeface="Calibri"/>
-            </a:endParaRPr>
-          </a:p>
-          <a:p>
-            <a:pPr marL="285840" marR="0" lvl="0" indent="-285840" algn="l" rtl="0">
               <a:spcBef>
                 <a:spcPts val="0"/>
               </a:spcBef>
@@ -32147,40 +32411,16 @@
               <a:buChar char="▪"/>
             </a:pPr>
             <a:r>
-              <a:rPr lang="en" sz="3200" dirty="0" smtClean="0">
-                <a:solidFill>
-                  <a:schemeClr val="dk1"/>
-                </a:solidFill>
-                <a:latin typeface="Calibri"/>
-                <a:ea typeface="Calibri"/>
-                <a:cs typeface="Calibri"/>
-                <a:sym typeface="Calibri"/>
-              </a:rPr>
-              <a:t>C</a:t>
-            </a:r>
-            <a:r>
-              <a:rPr lang="en" sz="3200" b="0" strike="noStrike" dirty="0" smtClean="0">
-                <a:solidFill>
-                  <a:schemeClr val="dk1"/>
-                </a:solidFill>
-                <a:latin typeface="Calibri"/>
-                <a:ea typeface="Calibri"/>
-                <a:cs typeface="Calibri"/>
-                <a:sym typeface="Calibri"/>
-              </a:rPr>
-              <a:t>omposite </a:t>
-            </a:r>
-            <a:r>
-              <a:rPr lang="en" sz="3200" b="0" strike="noStrike" dirty="0">
-                <a:solidFill>
-                  <a:schemeClr val="dk1"/>
-                </a:solidFill>
-                <a:latin typeface="Calibri"/>
-                <a:ea typeface="Calibri"/>
-                <a:cs typeface="Calibri"/>
-                <a:sym typeface="Calibri"/>
-              </a:rPr>
-              <a:t>types can be used as keys</a:t>
+              <a:rPr lang="en" sz="2400" b="0" i="0" u="none" strike="noStrike" cap="none" dirty="0" smtClean="0">
+                <a:solidFill>
+                  <a:schemeClr val="dk1"/>
+                </a:solidFill>
+                <a:latin typeface="Calibri"/>
+                <a:ea typeface="Calibri"/>
+                <a:cs typeface="Calibri"/>
+                <a:sym typeface="Calibri"/>
+              </a:rPr>
+              <a:t>all the fields must be key types</a:t>
             </a:r>
           </a:p>
           <a:p>
@@ -32196,32 +32436,7 @@
               <a:buChar char="▪"/>
             </a:pPr>
             <a:r>
-              <a:rPr lang="en" sz="2800" b="0" i="0" u="none" strike="noStrike" cap="none" dirty="0" smtClean="0">
-                <a:solidFill>
-                  <a:schemeClr val="dk1"/>
-                </a:solidFill>
-                <a:latin typeface="Calibri"/>
-                <a:ea typeface="Calibri"/>
-                <a:cs typeface="Calibri"/>
-                <a:sym typeface="Calibri"/>
-              </a:rPr>
-              <a:t>all the fields must be key types</a:t>
-            </a:r>
-          </a:p>
-          <a:p>
-            <a:pPr marL="743040" marR="0" lvl="1" indent="-285840" algn="l" rtl="0">
-              <a:spcBef>
-                <a:spcPts val="0"/>
-              </a:spcBef>
-              <a:buClr>
-                <a:srgbClr val="34AD91"/>
-              </a:buClr>
-              <a:buSzPct val="100000"/>
-              <a:buFont typeface="Arial"/>
-              <a:buChar char="▪"/>
-            </a:pPr>
-            <a:r>
-              <a:rPr lang="en" sz="2800" b="0" i="0" u="none" strike="noStrike" cap="none" dirty="0" smtClean="0">
+              <a:rPr lang="en" sz="2400" b="0" i="0" u="none" strike="noStrike" cap="none" dirty="0" smtClean="0">
                 <a:solidFill>
                   <a:srgbClr val="000000"/>
                 </a:solidFill>
@@ -32233,7 +32448,7 @@
               <a:t>nested </a:t>
             </a:r>
             <a:r>
-              <a:rPr lang="en" sz="2800" b="0" i="0" u="none" strike="noStrike" cap="none" dirty="0">
+              <a:rPr lang="en" sz="2400" b="0" i="0" u="none" strike="noStrike" cap="none" dirty="0">
                 <a:solidFill>
                   <a:srgbClr val="000000"/>
                 </a:solidFill>
@@ -34333,7 +34548,7 @@
               <a:buNone/>
             </a:pPr>
             <a:r>
-              <a:rPr lang="en" sz="2000" b="0" strike="noStrike">
+              <a:rPr lang="en" sz="2000" b="0" strike="noStrike" dirty="0">
                 <a:solidFill>
                   <a:srgbClr val="000000"/>
                 </a:solidFill>
@@ -34357,7 +34572,7 @@
               <a:buNone/>
             </a:pPr>
             <a:r>
-              <a:rPr lang="en" sz="2000" b="0" strike="noStrike">
+              <a:rPr lang="en" sz="2000" b="0" strike="noStrike" dirty="0">
                 <a:solidFill>
                   <a:srgbClr val="000000"/>
                 </a:solidFill>
@@ -34379,7 +34594,7 @@
               </a:spcBef>
               <a:buNone/>
             </a:pPr>
-            <a:endParaRPr sz="2000" b="0" strike="noStrike">
+            <a:endParaRPr sz="2000" b="0" strike="noStrike" dirty="0">
               <a:solidFill>
                 <a:srgbClr val="000000"/>
               </a:solidFill>
@@ -34401,7 +34616,7 @@
               <a:buNone/>
             </a:pPr>
             <a:r>
-              <a:rPr lang="en" sz="2000">
+              <a:rPr lang="en" sz="2000" dirty="0">
                 <a:solidFill>
                   <a:schemeClr val="dk1"/>
                 </a:solidFill>
@@ -34413,19 +34628,70 @@
               <a:t>DataStream&lt;String&gt; result </a:t>
             </a:r>
             <a:r>
-              <a:rPr lang="en" sz="2000" b="0" strike="noStrike">
-                <a:solidFill>
-                  <a:srgbClr val="000000"/>
-                </a:solidFill>
-                <a:latin typeface="Consolas"/>
-                <a:ea typeface="Consolas"/>
-                <a:cs typeface="Consolas"/>
-                <a:sym typeface="Consolas"/>
-              </a:rPr>
-              <a:t>= control</a:t>
-            </a:r>
-            <a:r>
-              <a:rPr lang="en" sz="2000" b="0" strike="noStrike">
+              <a:rPr lang="en" sz="2000" b="0" strike="noStrike" dirty="0">
+                <a:solidFill>
+                  <a:srgbClr val="000000"/>
+                </a:solidFill>
+                <a:latin typeface="Consolas"/>
+                <a:ea typeface="Consolas"/>
+                <a:cs typeface="Consolas"/>
+                <a:sym typeface="Consolas"/>
+              </a:rPr>
+              <a:t>= </a:t>
+            </a:r>
+            <a:r>
+              <a:rPr lang="en" sz="2000" b="0" strike="noStrike" dirty="0" smtClean="0">
+                <a:solidFill>
+                  <a:srgbClr val="000000"/>
+                </a:solidFill>
+                <a:latin typeface="Consolas"/>
+                <a:ea typeface="Consolas"/>
+                <a:cs typeface="Consolas"/>
+                <a:sym typeface="Consolas"/>
+              </a:rPr>
+              <a:t>control</a:t>
+            </a:r>
+            <a:endParaRPr lang="en-US" sz="2000" b="0" strike="noStrike" dirty="0" smtClean="0">
+              <a:solidFill>
+                <a:srgbClr val="000000"/>
+              </a:solidFill>
+              <a:latin typeface="Consolas"/>
+              <a:ea typeface="Consolas"/>
+              <a:cs typeface="Consolas"/>
+              <a:sym typeface="Consolas"/>
+            </a:endParaRPr>
+          </a:p>
+          <a:p>
+            <a:pPr marL="0" marR="0" lvl="0" indent="0" algn="l" rtl="0">
+              <a:lnSpc>
+                <a:spcPct val="100000"/>
+              </a:lnSpc>
+              <a:spcBef>
+                <a:spcPts val="0"/>
+              </a:spcBef>
+              <a:buSzPct val="25000"/>
+              <a:buNone/>
+            </a:pPr>
+            <a:r>
+              <a:rPr lang="en-US" sz="2000" dirty="0">
+                <a:latin typeface="Consolas"/>
+                <a:ea typeface="Consolas"/>
+                <a:cs typeface="Consolas"/>
+                <a:sym typeface="Consolas"/>
+              </a:rPr>
+              <a:t> </a:t>
+            </a:r>
+            <a:r>
+              <a:rPr lang="en-US" sz="2000" dirty="0" smtClean="0">
+                <a:latin typeface="Consolas"/>
+                <a:ea typeface="Consolas"/>
+                <a:cs typeface="Consolas"/>
+                <a:sym typeface="Consolas"/>
+              </a:rPr>
+              <a:t> </a:t>
+            </a:r>
+            <a:r>
+              <a:rPr lang="en" sz="2000" b="0" strike="noStrike" dirty="0" smtClean="0">
                 <a:solidFill>
                   <a:srgbClr val="FF0000"/>
                 </a:solidFill>
@@ -34434,10 +34700,22 @@
                 <a:cs typeface="Consolas"/>
                 <a:sym typeface="Consolas"/>
               </a:rPr>
-              <a:t>.connect</a:t>
-            </a:r>
-            <a:r>
-              <a:rPr lang="en" sz="2000" b="0" strike="noStrike">
+              <a:t>.</a:t>
+            </a:r>
+            <a:r>
+              <a:rPr lang="en" sz="2000" b="0" strike="noStrike" dirty="0">
+                <a:solidFill>
+                  <a:srgbClr val="FF0000"/>
+                </a:solidFill>
+                <a:latin typeface="Consolas"/>
+                <a:ea typeface="Consolas"/>
+                <a:cs typeface="Consolas"/>
+                <a:sym typeface="Consolas"/>
+              </a:rPr>
+              <a:t>connect</a:t>
+            </a:r>
+            <a:r>
+              <a:rPr lang="en" sz="2000" b="0" strike="noStrike" dirty="0">
                 <a:solidFill>
                   <a:srgbClr val="000000"/>
                 </a:solidFill>
@@ -34458,7 +34736,7 @@
               <a:buNone/>
             </a:pPr>
             <a:r>
-              <a:rPr lang="en" sz="2000">
+              <a:rPr lang="en" sz="2000" dirty="0">
                 <a:solidFill>
                   <a:srgbClr val="FF0000"/>
                 </a:solidFill>
@@ -34467,10 +34745,58 @@
                 <a:cs typeface="Consolas"/>
                 <a:sym typeface="Consolas"/>
               </a:rPr>
-              <a:t>  .flatMap(new MyCoFlatMap())</a:t>
-            </a:r>
-            <a:r>
-              <a:rPr lang="en" sz="2000">
+              <a:t>  .</a:t>
+            </a:r>
+            <a:r>
+              <a:rPr lang="en" sz="2000" dirty="0" err="1">
+                <a:solidFill>
+                  <a:srgbClr val="FF0000"/>
+                </a:solidFill>
+                <a:latin typeface="Consolas"/>
+                <a:ea typeface="Consolas"/>
+                <a:cs typeface="Consolas"/>
+                <a:sym typeface="Consolas"/>
+              </a:rPr>
+              <a:t>flatMap</a:t>
+            </a:r>
+            <a:r>
+              <a:rPr lang="en" sz="2000" dirty="0">
+                <a:solidFill>
+                  <a:srgbClr val="FF0000"/>
+                </a:solidFill>
+                <a:latin typeface="Consolas"/>
+                <a:ea typeface="Consolas"/>
+                <a:cs typeface="Consolas"/>
+                <a:sym typeface="Consolas"/>
+              </a:rPr>
+              <a:t>(new </a:t>
+            </a:r>
+            <a:r>
+              <a:rPr lang="en" sz="2000" dirty="0" err="1">
+                <a:solidFill>
+                  <a:srgbClr val="FF0000"/>
+                </a:solidFill>
+                <a:latin typeface="Consolas"/>
+                <a:ea typeface="Consolas"/>
+                <a:cs typeface="Consolas"/>
+                <a:sym typeface="Consolas"/>
+              </a:rPr>
+              <a:t>MyCoFlatMap</a:t>
+            </a:r>
+            <a:r>
+              <a:rPr lang="en" sz="2000" dirty="0">
+                <a:solidFill>
+                  <a:srgbClr val="FF0000"/>
+                </a:solidFill>
+                <a:latin typeface="Consolas"/>
+                <a:ea typeface="Consolas"/>
+                <a:cs typeface="Consolas"/>
+                <a:sym typeface="Consolas"/>
+              </a:rPr>
+              <a:t>())</a:t>
+            </a:r>
+            <a:r>
+              <a:rPr lang="en" sz="2000" dirty="0">
                 <a:solidFill>
                   <a:schemeClr val="dk1"/>
                 </a:solidFill>
@@ -34482,7 +34808,7 @@
               <a:t>;</a:t>
             </a:r>
             <a:br>
-              <a:rPr lang="en" sz="2000">
+              <a:rPr lang="en" sz="2000" dirty="0">
                 <a:solidFill>
                   <a:schemeClr val="dk1"/>
                 </a:solidFill>
@@ -34492,7 +34818,7 @@
                 <a:sym typeface="Consolas"/>
               </a:rPr>
             </a:br>
-            <a:endParaRPr lang="en" sz="2000">
+            <a:endParaRPr lang="en" sz="2000" dirty="0">
               <a:solidFill>
                 <a:schemeClr val="dk1"/>
               </a:solidFill>
@@ -37430,16 +37756,40 @@
               <a:buNone/>
             </a:pPr>
             <a:r>
-              <a:rPr lang="en" sz="4000" b="0" strike="noStrike">
-                <a:solidFill>
-                  <a:srgbClr val="000000"/>
-                </a:solidFill>
-                <a:latin typeface="Calibri"/>
-                <a:ea typeface="Calibri"/>
-                <a:cs typeface="Calibri"/>
-                <a:sym typeface="Calibri"/>
-              </a:rPr>
-              <a:t>Map on Connected Streams</a:t>
+              <a:rPr lang="en-US" sz="3200" b="0" strike="noStrike" dirty="0" smtClean="0">
+                <a:solidFill>
+                  <a:srgbClr val="000000"/>
+                </a:solidFill>
+                <a:latin typeface="Calibri"/>
+                <a:ea typeface="Calibri"/>
+                <a:cs typeface="Calibri"/>
+                <a:sym typeface="Calibri"/>
+              </a:rPr>
+              <a:t>Can also use </a:t>
+            </a:r>
+            <a:r>
+              <a:rPr lang="en" sz="3200" b="0" strike="noStrike" dirty="0" smtClean="0">
+                <a:solidFill>
+                  <a:srgbClr val="000000"/>
+                </a:solidFill>
+                <a:latin typeface="Calibri"/>
+                <a:ea typeface="Calibri"/>
+                <a:cs typeface="Calibri"/>
+                <a:sym typeface="Calibri"/>
+              </a:rPr>
+              <a:t>Map </a:t>
+            </a:r>
+            <a:r>
+              <a:rPr lang="en" sz="3200" b="0" strike="noStrike" dirty="0">
+                <a:solidFill>
+                  <a:srgbClr val="000000"/>
+                </a:solidFill>
+                <a:latin typeface="Calibri"/>
+                <a:ea typeface="Calibri"/>
+                <a:cs typeface="Calibri"/>
+                <a:sym typeface="Calibri"/>
+              </a:rPr>
+              <a:t>on Connected Streams</a:t>
             </a:r>
           </a:p>
         </p:txBody>
@@ -41048,7 +41398,7 @@
               <a:t> to quickly </a:t>
             </a:r>
             <a:r>
-              <a:rPr lang="en-US" sz="3200" b="0" strike="noStrike" smtClean="0">
+              <a:rPr lang="en-US" sz="3200" b="0" strike="noStrike" dirty="0" smtClean="0">
                 <a:solidFill>
                   <a:srgbClr val="000000"/>
                 </a:solidFill>
@@ -41060,7 +41410,7 @@
               <a:t>create </a:t>
             </a:r>
             <a:r>
-              <a:rPr lang="en" sz="3200" b="0" strike="noStrike" smtClean="0">
+              <a:rPr lang="en" sz="3200" b="0" strike="noStrike" dirty="0" smtClean="0">
                 <a:solidFill>
                   <a:srgbClr val="000000"/>
                 </a:solidFill>
@@ -41153,8 +41503,106 @@
                 <a:cs typeface="Calibri"/>
                 <a:sym typeface="Calibri"/>
               </a:rPr>
-              <a:t> to print a DataStream</a:t>
-            </a:r>
+              <a:t> to print a </a:t>
+            </a:r>
+            <a:r>
+              <a:rPr lang="en" sz="3200" b="0" strike="noStrike" dirty="0" smtClean="0">
+                <a:solidFill>
+                  <a:srgbClr val="000000"/>
+                </a:solidFill>
+                <a:latin typeface="Calibri"/>
+                <a:ea typeface="Calibri"/>
+                <a:cs typeface="Calibri"/>
+                <a:sym typeface="Calibri"/>
+              </a:rPr>
+              <a:t>DataStream</a:t>
+            </a:r>
+            <a:endParaRPr lang="en-US" sz="3200" b="0" strike="noStrike" dirty="0" smtClean="0">
+              <a:solidFill>
+                <a:srgbClr val="000000"/>
+              </a:solidFill>
+              <a:latin typeface="Calibri"/>
+              <a:ea typeface="Calibri"/>
+              <a:cs typeface="Calibri"/>
+              <a:sym typeface="Calibri"/>
+            </a:endParaRPr>
+          </a:p>
+          <a:p>
+            <a:pPr marL="343080" marR="0" lvl="0" indent="-343080" algn="l" rtl="0">
+              <a:lnSpc>
+                <a:spcPct val="100000"/>
+              </a:lnSpc>
+              <a:spcBef>
+                <a:spcPts val="0"/>
+              </a:spcBef>
+              <a:buClr>
+                <a:srgbClr val="34AD91"/>
+              </a:buClr>
+              <a:buSzPct val="100000"/>
+              <a:buFont typeface="Noto Sans Symbols"/>
+              <a:buChar char="▪"/>
+            </a:pPr>
+            <a:endParaRPr lang="en-US" sz="3200" dirty="0">
+              <a:latin typeface="Calibri"/>
+              <a:ea typeface="Calibri"/>
+              <a:cs typeface="Calibri"/>
+              <a:sym typeface="Calibri"/>
+            </a:endParaRPr>
+          </a:p>
+          <a:p>
+            <a:pPr marL="343080" marR="0" lvl="0" indent="-343080" algn="l" rtl="0">
+              <a:lnSpc>
+                <a:spcPct val="100000"/>
+              </a:lnSpc>
+              <a:spcBef>
+                <a:spcPts val="0"/>
+              </a:spcBef>
+              <a:buClr>
+                <a:srgbClr val="34AD91"/>
+              </a:buClr>
+              <a:buSzPct val="100000"/>
+              <a:buFont typeface="Noto Sans Symbols"/>
+              <a:buChar char="▪"/>
+            </a:pPr>
+            <a:r>
+              <a:rPr lang="en-US" sz="3200" b="0" strike="noStrike" dirty="0" smtClean="0">
+                <a:solidFill>
+                  <a:srgbClr val="000000"/>
+                </a:solidFill>
+                <a:latin typeface="Calibri"/>
+                <a:ea typeface="Calibri"/>
+                <a:cs typeface="Calibri"/>
+                <a:sym typeface="Calibri"/>
+              </a:rPr>
+              <a:t>Lazy execution can make </a:t>
+            </a:r>
+            <a:r>
+              <a:rPr lang="en-US" sz="3200" b="0" strike="noStrike" smtClean="0">
+                <a:solidFill>
+                  <a:srgbClr val="000000"/>
+                </a:solidFill>
+                <a:latin typeface="Calibri"/>
+                <a:ea typeface="Calibri"/>
+                <a:cs typeface="Calibri"/>
+                <a:sym typeface="Calibri"/>
+              </a:rPr>
+              <a:t>debugging tricky</a:t>
+            </a:r>
+            <a:r>
+              <a:rPr lang="en-US" sz="3200" smtClean="0">
+                <a:latin typeface="Calibri"/>
+                <a:ea typeface="Calibri"/>
+                <a:cs typeface="Calibri"/>
+                <a:sym typeface="Calibri"/>
+              </a:rPr>
+              <a:t>, but you can use breakpoints in your IDE</a:t>
+            </a:r>
+            <a:endParaRPr lang="en-US" sz="3200" dirty="0">
+              <a:latin typeface="Calibri"/>
+              <a:ea typeface="Calibri"/>
+              <a:cs typeface="Calibri"/>
+              <a:sym typeface="Calibri"/>
+            </a:endParaRPr>
           </a:p>
         </p:txBody>
       </p:sp>
@@ -41204,323 +41652,6 @@
                 <a:sym typeface="Calibri"/>
               </a:rPr>
               <a:t>44</a:t>
-            </a:fld>
-            <a:endParaRPr lang="en" sz="1200" b="0" strike="noStrike">
-              <a:solidFill>
-                <a:srgbClr val="8B8B8B"/>
-              </a:solidFill>
-              <a:latin typeface="Calibri"/>
-              <a:ea typeface="Calibri"/>
-              <a:cs typeface="Calibri"/>
-              <a:sym typeface="Calibri"/>
-            </a:endParaRPr>
-          </a:p>
-        </p:txBody>
-      </p:sp>
-    </p:spTree>
-  </p:cSld>
-  <p:clrMapOvr>
-    <a:masterClrMapping/>
-  </p:clrMapOvr>
-</p:sld>
-</file>
-
-<file path=ppt/slides/slide45.xml><?xml version="1.0" encoding="utf-8"?>
-<p:sld xmlns:a="http://schemas.openxmlformats.org/drawingml/2006/main" xmlns:r="http://schemas.openxmlformats.org/officeDocument/2006/relationships" xmlns:p="http://schemas.openxmlformats.org/presentationml/2006/main">
-  <p:cSld>
-    <p:spTree>
-      <p:nvGrpSpPr>
-        <p:cNvPr id="1" name="Shape 427"/>
-        <p:cNvGrpSpPr/>
-        <p:nvPr/>
-      </p:nvGrpSpPr>
-      <p:grpSpPr>
-        <a:xfrm>
-          <a:off x="0" y="0"/>
-          <a:ext cx="0" cy="0"/>
-          <a:chOff x="0" y="0"/>
-          <a:chExt cx="0" cy="0"/>
-        </a:xfrm>
-      </p:grpSpPr>
-      <p:sp>
-        <p:nvSpPr>
-          <p:cNvPr id="428" name="Shape 428"/>
-          <p:cNvSpPr txBox="1"/>
-          <p:nvPr/>
-        </p:nvSpPr>
-        <p:spPr>
-          <a:xfrm>
-            <a:off x="457200" y="274680"/>
-            <a:ext cx="7474320" cy="898200"/>
-          </a:xfrm>
-          <a:prstGeom prst="rect">
-            <a:avLst/>
-          </a:prstGeom>
-          <a:noFill/>
-          <a:ln>
-            <a:noFill/>
-          </a:ln>
-        </p:spPr>
-        <p:txBody>
-          <a:bodyPr lIns="91425" tIns="45700" rIns="91425" bIns="45700" anchor="ctr" anchorCtr="0">
-            <a:noAutofit/>
-          </a:bodyPr>
-          <a:lstStyle/>
-          <a:p>
-            <a:pPr marL="0" marR="0" lvl="0" indent="0" algn="l" rtl="0">
-              <a:lnSpc>
-                <a:spcPct val="100000"/>
-              </a:lnSpc>
-              <a:spcBef>
-                <a:spcPts val="0"/>
-              </a:spcBef>
-              <a:buSzPct val="25000"/>
-              <a:buNone/>
-            </a:pPr>
-            <a:r>
-              <a:rPr lang="en" sz="4400" b="0" strike="noStrike">
-                <a:solidFill>
-                  <a:srgbClr val="000000"/>
-                </a:solidFill>
-                <a:latin typeface="Calibri"/>
-                <a:ea typeface="Calibri"/>
-                <a:cs typeface="Calibri"/>
-                <a:sym typeface="Calibri"/>
-              </a:rPr>
-              <a:t>References</a:t>
-            </a:r>
-          </a:p>
-        </p:txBody>
-      </p:sp>
-      <p:sp>
-        <p:nvSpPr>
-          <p:cNvPr id="429" name="Shape 429"/>
-          <p:cNvSpPr txBox="1"/>
-          <p:nvPr/>
-        </p:nvSpPr>
-        <p:spPr>
-          <a:xfrm>
-            <a:off x="457200" y="1474200"/>
-            <a:ext cx="8229239" cy="4651559"/>
-          </a:xfrm>
-          <a:prstGeom prst="rect">
-            <a:avLst/>
-          </a:prstGeom>
-          <a:noFill/>
-          <a:ln>
-            <a:noFill/>
-          </a:ln>
-        </p:spPr>
-        <p:txBody>
-          <a:bodyPr lIns="91425" tIns="45700" rIns="91425" bIns="45700" anchor="t" anchorCtr="0">
-            <a:noAutofit/>
-          </a:bodyPr>
-          <a:lstStyle/>
-          <a:p>
-            <a:pPr marL="343080" marR="0" lvl="0" indent="-343080" algn="l" rtl="0">
-              <a:lnSpc>
-                <a:spcPct val="100000"/>
-              </a:lnSpc>
-              <a:spcBef>
-                <a:spcPts val="0"/>
-              </a:spcBef>
-              <a:buClr>
-                <a:srgbClr val="34AD91"/>
-              </a:buClr>
-              <a:buSzPct val="100000"/>
-              <a:buFont typeface="Noto Sans Symbols"/>
-              <a:buChar char="▪"/>
-            </a:pPr>
-            <a:r>
-              <a:rPr lang="en" sz="3200" b="0" strike="noStrike">
-                <a:solidFill>
-                  <a:srgbClr val="000000"/>
-                </a:solidFill>
-                <a:latin typeface="Calibri"/>
-                <a:ea typeface="Calibri"/>
-                <a:cs typeface="Calibri"/>
-                <a:sym typeface="Calibri"/>
-              </a:rPr>
-              <a:t>Documentation</a:t>
-            </a:r>
-          </a:p>
-          <a:p>
-            <a:pPr marL="743040" marR="0" lvl="1" indent="-285840" algn="l" rtl="0">
-              <a:lnSpc>
-                <a:spcPct val="100000"/>
-              </a:lnSpc>
-              <a:spcBef>
-                <a:spcPts val="0"/>
-              </a:spcBef>
-              <a:buClr>
-                <a:srgbClr val="34AD91"/>
-              </a:buClr>
-              <a:buSzPct val="100000"/>
-              <a:buFont typeface="Arial"/>
-              <a:buChar char="•"/>
-            </a:pPr>
-            <a:r>
-              <a:rPr lang="en" sz="2800" u="sng">
-                <a:solidFill>
-                  <a:schemeClr val="hlink"/>
-                </a:solidFill>
-                <a:latin typeface="Calibri"/>
-                <a:ea typeface="Calibri"/>
-                <a:cs typeface="Calibri"/>
-                <a:sym typeface="Calibri"/>
-                <a:hlinkClick r:id="rId3"/>
-              </a:rPr>
-              <a:t>https://ci.apache.org/projects/flink/flink-docs-release-1.2/dev/datastream_api.html</a:t>
-            </a:r>
-          </a:p>
-          <a:p>
-            <a:pPr marL="457560" marR="0" lvl="1" indent="-360" algn="l" rtl="0">
-              <a:lnSpc>
-                <a:spcPct val="100000"/>
-              </a:lnSpc>
-              <a:spcBef>
-                <a:spcPts val="0"/>
-              </a:spcBef>
-              <a:buNone/>
-            </a:pPr>
-            <a:endParaRPr sz="2400" b="0" i="0" u="none" strike="noStrike" cap="none">
-              <a:solidFill>
-                <a:srgbClr val="000000"/>
-              </a:solidFill>
-              <a:latin typeface="Calibri"/>
-              <a:ea typeface="Calibri"/>
-              <a:cs typeface="Calibri"/>
-              <a:sym typeface="Calibri"/>
-            </a:endParaRPr>
-          </a:p>
-          <a:p>
-            <a:pPr marL="343080" marR="0" lvl="0" indent="-343080" algn="l" rtl="0">
-              <a:lnSpc>
-                <a:spcPct val="100000"/>
-              </a:lnSpc>
-              <a:spcBef>
-                <a:spcPts val="0"/>
-              </a:spcBef>
-              <a:buClr>
-                <a:srgbClr val="34AD91"/>
-              </a:buClr>
-              <a:buSzPct val="100000"/>
-              <a:buFont typeface="Noto Sans Symbols"/>
-              <a:buChar char="▪"/>
-            </a:pPr>
-            <a:r>
-              <a:rPr lang="en" sz="3200" b="0" strike="noStrike">
-                <a:solidFill>
-                  <a:srgbClr val="000000"/>
-                </a:solidFill>
-                <a:latin typeface="Calibri"/>
-                <a:ea typeface="Calibri"/>
-                <a:cs typeface="Calibri"/>
-                <a:sym typeface="Calibri"/>
-              </a:rPr>
-              <a:t>Blog posts</a:t>
-            </a:r>
-          </a:p>
-          <a:p>
-            <a:pPr marL="743040" marR="0" lvl="1" indent="-285840" algn="l" rtl="0">
-              <a:spcBef>
-                <a:spcPts val="0"/>
-              </a:spcBef>
-              <a:buClr>
-                <a:srgbClr val="34AD91"/>
-              </a:buClr>
-              <a:buSzPct val="100000"/>
-              <a:buFont typeface="Arial"/>
-              <a:buChar char="•"/>
-            </a:pPr>
-            <a:r>
-              <a:rPr lang="en" sz="2800" b="0" i="0" u="sng" strike="noStrike" cap="none">
-                <a:solidFill>
-                  <a:schemeClr val="hlink"/>
-                </a:solidFill>
-                <a:latin typeface="Calibri"/>
-                <a:ea typeface="Calibri"/>
-                <a:cs typeface="Calibri"/>
-                <a:sym typeface="Calibri"/>
-                <a:hlinkClick r:id="rId4"/>
-              </a:rPr>
-              <a:t>http://data-artisans.com/blog</a:t>
-            </a:r>
-          </a:p>
-          <a:p>
-            <a:pPr marL="743040" marR="0" lvl="1" indent="-285840" algn="l" rtl="0">
-              <a:spcBef>
-                <a:spcPts val="0"/>
-              </a:spcBef>
-              <a:buClr>
-                <a:srgbClr val="34AD91"/>
-              </a:buClr>
-              <a:buSzPct val="100000"/>
-              <a:buFont typeface="Arial"/>
-              <a:buChar char="•"/>
-            </a:pPr>
-            <a:r>
-              <a:rPr lang="en" sz="2800" b="0" i="0" u="sng" strike="noStrike" cap="none">
-                <a:solidFill>
-                  <a:schemeClr val="hlink"/>
-                </a:solidFill>
-                <a:latin typeface="Calibri"/>
-                <a:ea typeface="Calibri"/>
-                <a:cs typeface="Calibri"/>
-                <a:sym typeface="Calibri"/>
-                <a:hlinkClick r:id="rId5"/>
-              </a:rPr>
-              <a:t>https://flink.apache.org/blog</a:t>
-            </a:r>
-          </a:p>
-        </p:txBody>
-      </p:sp>
-      <p:sp>
-        <p:nvSpPr>
-          <p:cNvPr id="430" name="Shape 430"/>
-          <p:cNvSpPr txBox="1"/>
-          <p:nvPr/>
-        </p:nvSpPr>
-        <p:spPr>
-          <a:xfrm>
-            <a:off x="6553080" y="6356519"/>
-            <a:ext cx="2133360" cy="364679"/>
-          </a:xfrm>
-          <a:prstGeom prst="rect">
-            <a:avLst/>
-          </a:prstGeom>
-          <a:noFill/>
-          <a:ln>
-            <a:noFill/>
-          </a:ln>
-        </p:spPr>
-        <p:txBody>
-          <a:bodyPr lIns="91425" tIns="45700" rIns="91425" bIns="45700" anchor="ctr" anchorCtr="0">
-            <a:noAutofit/>
-          </a:bodyPr>
-          <a:lstStyle/>
-          <a:p>
-            <a:pPr marL="0" marR="0" lvl="0" indent="0" algn="r" rtl="0">
-              <a:lnSpc>
-                <a:spcPct val="100000"/>
-              </a:lnSpc>
-              <a:spcBef>
-                <a:spcPts val="0"/>
-              </a:spcBef>
-              <a:buSzPct val="25000"/>
-              <a:buNone/>
-            </a:pPr>
-            <a:fld id="{00000000-1234-1234-1234-123412341234}" type="slidenum">
-              <a:rPr lang="en" sz="1200" b="0" strike="noStrike">
-                <a:solidFill>
-                  <a:srgbClr val="8B8B8B"/>
-                </a:solidFill>
-                <a:latin typeface="Calibri"/>
-                <a:ea typeface="Calibri"/>
-                <a:cs typeface="Calibri"/>
-                <a:sym typeface="Calibri"/>
-              </a:rPr>
-              <a:t>45</a:t>
             </a:fld>
             <a:endParaRPr lang="en" sz="1200" b="0" strike="noStrike">
               <a:solidFill>

</xml_diff>

<commit_message>
Finished updates for training at FFB. New nav, updates slides.
</commit_message>
<xml_diff>
--- a/slides/flink_stream_basics.pptx
+++ b/slides/flink_stream_basics.pptx
@@ -15637,7 +15637,7 @@
                 <a:cs typeface="Calibri"/>
                 <a:sym typeface="Calibri"/>
               </a:rPr>
-              <a:t>19</a:t>
+              <a:t>8</a:t>
             </a:r>
             <a:r>
               <a:rPr lang="en-US" sz="2000" dirty="0" smtClean="0">
@@ -15649,7 +15649,7 @@
                 <a:cs typeface="Calibri"/>
                 <a:sym typeface="Calibri"/>
               </a:rPr>
-              <a:t>.06.</a:t>
+              <a:t>.9.</a:t>
             </a:r>
             <a:r>
               <a:rPr lang="en" sz="2000" dirty="0" smtClean="0">
@@ -25170,7 +25170,7 @@
               <a:t>1.</a:t>
             </a:r>
             <a:r>
-              <a:rPr lang="en-US" sz="3200" dirty="0">
+              <a:rPr lang="en-US" sz="3200" dirty="0" smtClean="0">
                 <a:latin typeface="Calibri"/>
                 <a:ea typeface="Calibri"/>
                 <a:cs typeface="Calibri"/>
@@ -25187,81 +25187,6 @@
               <a:cs typeface="Calibri"/>
               <a:sym typeface="Calibri"/>
             </a:endParaRPr>
-          </a:p>
-          <a:p>
-            <a:pPr marL="0" marR="0" lvl="0" indent="0" algn="l" rtl="0">
-              <a:lnSpc>
-                <a:spcPct val="100000"/>
-              </a:lnSpc>
-              <a:spcBef>
-                <a:spcPts val="0"/>
-              </a:spcBef>
-              <a:buNone/>
-            </a:pPr>
-            <a:endParaRPr sz="3200" b="0" strike="noStrike" dirty="0">
-              <a:solidFill>
-                <a:srgbClr val="000000"/>
-              </a:solidFill>
-              <a:latin typeface="Calibri"/>
-              <a:ea typeface="Calibri"/>
-              <a:cs typeface="Calibri"/>
-              <a:sym typeface="Calibri"/>
-            </a:endParaRPr>
-          </a:p>
-          <a:p>
-            <a:pPr marL="343080" marR="0" lvl="0" indent="-343080" algn="l" rtl="0">
-              <a:lnSpc>
-                <a:spcPct val="100000"/>
-              </a:lnSpc>
-              <a:spcBef>
-                <a:spcPts val="0"/>
-              </a:spcBef>
-              <a:spcAft>
-                <a:spcPts val="0"/>
-              </a:spcAft>
-              <a:buClr>
-                <a:srgbClr val="34AD91"/>
-              </a:buClr>
-              <a:buSzPct val="100000"/>
-              <a:buFont typeface="Noto Sans Symbols"/>
-              <a:buChar char="▪"/>
-            </a:pPr>
-            <a:r>
-              <a:rPr lang="en" sz="3200" b="0" strike="noStrike" dirty="0">
-                <a:solidFill>
-                  <a:srgbClr val="000000"/>
-                </a:solidFill>
-                <a:latin typeface="Calibri"/>
-                <a:ea typeface="Calibri"/>
-                <a:cs typeface="Calibri"/>
-                <a:sym typeface="Calibri"/>
-              </a:rPr>
-              <a:t>Documentation available at </a:t>
-            </a:r>
-          </a:p>
-          <a:p>
-            <a:pPr marL="0" marR="0" lvl="0" indent="0" algn="ctr" rtl="0">
-              <a:lnSpc>
-                <a:spcPct val="100000"/>
-              </a:lnSpc>
-              <a:spcBef>
-                <a:spcPts val="1800"/>
-              </a:spcBef>
-              <a:buSzPct val="25000"/>
-              <a:buNone/>
-            </a:pPr>
-            <a:r>
-              <a:rPr lang="en" sz="3200" b="0" strike="noStrike" dirty="0">
-                <a:solidFill>
-                  <a:srgbClr val="000000"/>
-                </a:solidFill>
-                <a:latin typeface="Calibri"/>
-                <a:ea typeface="Calibri"/>
-                <a:cs typeface="Calibri"/>
-                <a:sym typeface="Calibri"/>
-              </a:rPr>
-              <a:t>flink.apache.org</a:t>
-            </a:r>
           </a:p>
         </p:txBody>
       </p:sp>

</xml_diff>